<commit_message>
add Echo show investigation. Note the version is a pre-release and some of the PPTs, fix links
</commit_message>
<xml_diff>
--- a/Echo_Device/ppts/3_Image_Acquisition_and_Mounting.pptx
+++ b/Echo_Device/ppts/3_Image_Acquisition_and_Mounting.pptx
@@ -5,7 +5,7 @@
     <p:sldMasterId id="2147483648" r:id="rId1"/>
   </p:sldMasterIdLst>
   <p:notesMasterIdLst>
-    <p:notesMasterId r:id="rId19"/>
+    <p:notesMasterId r:id="rId23"/>
   </p:notesMasterIdLst>
   <p:sldIdLst>
     <p:sldId id="889" r:id="rId2"/>
@@ -15,16 +15,20 @@
     <p:sldId id="857" r:id="rId6"/>
     <p:sldId id="840" r:id="rId7"/>
     <p:sldId id="887" r:id="rId8"/>
-    <p:sldId id="888" r:id="rId9"/>
-    <p:sldId id="346" r:id="rId10"/>
-    <p:sldId id="866" r:id="rId11"/>
-    <p:sldId id="886" r:id="rId12"/>
-    <p:sldId id="348" r:id="rId13"/>
-    <p:sldId id="357" r:id="rId14"/>
-    <p:sldId id="358" r:id="rId15"/>
-    <p:sldId id="885" r:id="rId16"/>
-    <p:sldId id="380" r:id="rId17"/>
-    <p:sldId id="359" r:id="rId18"/>
+    <p:sldId id="894" r:id="rId9"/>
+    <p:sldId id="888" r:id="rId10"/>
+    <p:sldId id="893" r:id="rId11"/>
+    <p:sldId id="346" r:id="rId12"/>
+    <p:sldId id="866" r:id="rId13"/>
+    <p:sldId id="886" r:id="rId14"/>
+    <p:sldId id="891" r:id="rId15"/>
+    <p:sldId id="892" r:id="rId16"/>
+    <p:sldId id="357" r:id="rId17"/>
+    <p:sldId id="358" r:id="rId18"/>
+    <p:sldId id="885" r:id="rId19"/>
+    <p:sldId id="380" r:id="rId20"/>
+    <p:sldId id="359" r:id="rId21"/>
+    <p:sldId id="895" r:id="rId22"/>
   </p:sldIdLst>
   <p:sldSz cx="12192000" cy="6858000"/>
   <p:notesSz cx="6858000" cy="9144000"/>
@@ -213,7 +217,7 @@
           <a:p>
             <a:fld id="{EE41F6E3-57F9-402E-BDBA-5B2DE11C8530}" type="datetimeFigureOut">
               <a:rPr lang="en-US" smtClean="0"/>
-              <a:t>12/6/23</a:t>
+              <a:t>1/4/24</a:t>
             </a:fld>
             <a:endParaRPr lang="en-US"/>
           </a:p>
@@ -554,7 +558,7 @@
           <a:p>
             <a:fld id="{DDBF98C7-164A-4723-84F0-B1E4B080DDEC}" type="slidenum">
               <a:rPr lang="en-US" smtClean="0"/>
-              <a:t>14</a:t>
+              <a:t>17</a:t>
             </a:fld>
             <a:endParaRPr lang="en-US"/>
           </a:p>
@@ -647,7 +651,7 @@
           <a:p>
             <a:fld id="{DDBF98C7-164A-4723-84F0-B1E4B080DDEC}" type="slidenum">
               <a:rPr lang="en-US" smtClean="0"/>
-              <a:t>15</a:t>
+              <a:t>18</a:t>
             </a:fld>
             <a:endParaRPr lang="en-US"/>
           </a:p>
@@ -795,7 +799,7 @@
           <a:p>
             <a:fld id="{41259AFC-504E-1C4E-B6EF-55A9A474ECB1}" type="datetime1">
               <a:rPr lang="en-US" smtClean="0"/>
-              <a:t>12/6/23</a:t>
+              <a:t>1/4/24</a:t>
             </a:fld>
             <a:endParaRPr lang="en-US"/>
           </a:p>
@@ -968,7 +972,7 @@
           <a:p>
             <a:fld id="{D0F9DBC4-577B-D840-8CA5-93F4B76C0210}" type="datetime1">
               <a:rPr lang="en-US" smtClean="0"/>
-              <a:t>12/6/23</a:t>
+              <a:t>1/4/24</a:t>
             </a:fld>
             <a:endParaRPr lang="en-US"/>
           </a:p>
@@ -1146,7 +1150,7 @@
           <a:p>
             <a:fld id="{227C5582-5046-3E42-BCC7-72ADA1A24621}" type="datetime1">
               <a:rPr lang="en-US" smtClean="0"/>
-              <a:t>12/6/23</a:t>
+              <a:t>1/4/24</a:t>
             </a:fld>
             <a:endParaRPr lang="en-US"/>
           </a:p>
@@ -1314,7 +1318,7 @@
           <a:p>
             <a:fld id="{1FD79B34-1669-4741-B0AB-B90F9E524E4C}" type="datetime1">
               <a:rPr lang="en-US" smtClean="0"/>
-              <a:t>12/6/23</a:t>
+              <a:t>1/4/24</a:t>
             </a:fld>
             <a:endParaRPr lang="en-US"/>
           </a:p>
@@ -1559,7 +1563,7 @@
           <a:p>
             <a:fld id="{BAC2E8E5-437A-4043-8EB7-FC47F00F1EF6}" type="datetime1">
               <a:rPr lang="en-US" smtClean="0"/>
-              <a:t>12/6/23</a:t>
+              <a:t>1/4/24</a:t>
             </a:fld>
             <a:endParaRPr lang="en-US"/>
           </a:p>
@@ -1788,7 +1792,7 @@
           <a:p>
             <a:fld id="{38F7D966-F9DC-0540-930B-E1258AAFF056}" type="datetime1">
               <a:rPr lang="en-US" smtClean="0"/>
-              <a:t>12/6/23</a:t>
+              <a:t>1/4/24</a:t>
             </a:fld>
             <a:endParaRPr lang="en-US"/>
           </a:p>
@@ -2152,7 +2156,7 @@
           <a:p>
             <a:fld id="{9982B607-4871-FB40-9574-39B6CEB2812A}" type="datetime1">
               <a:rPr lang="en-US" smtClean="0"/>
-              <a:t>12/6/23</a:t>
+              <a:t>1/4/24</a:t>
             </a:fld>
             <a:endParaRPr lang="en-US"/>
           </a:p>
@@ -2269,7 +2273,7 @@
           <a:p>
             <a:fld id="{AABA27B2-8C00-F84D-ABBA-9E279CB9D7DB}" type="datetime1">
               <a:rPr lang="en-US" smtClean="0"/>
-              <a:t>12/6/23</a:t>
+              <a:t>1/4/24</a:t>
             </a:fld>
             <a:endParaRPr lang="en-US"/>
           </a:p>
@@ -2364,7 +2368,7 @@
           <a:p>
             <a:fld id="{B422F593-57A6-2B42-9344-2115EAEE62EE}" type="datetime1">
               <a:rPr lang="en-US" smtClean="0"/>
-              <a:t>12/6/23</a:t>
+              <a:t>1/4/24</a:t>
             </a:fld>
             <a:endParaRPr lang="en-US"/>
           </a:p>
@@ -2639,7 +2643,7 @@
           <a:p>
             <a:fld id="{190F6A29-CBA8-FC40-8655-A3A03586A58F}" type="datetime1">
               <a:rPr lang="en-US" smtClean="0"/>
-              <a:t>12/6/23</a:t>
+              <a:t>1/4/24</a:t>
             </a:fld>
             <a:endParaRPr lang="en-US"/>
           </a:p>
@@ -2891,7 +2895,7 @@
           <a:p>
             <a:fld id="{C61BE55D-101C-1E42-8ADB-8C738A947EF3}" type="datetime1">
               <a:rPr lang="en-US" smtClean="0"/>
-              <a:t>12/6/23</a:t>
+              <a:t>1/4/24</a:t>
             </a:fld>
             <a:endParaRPr lang="en-US"/>
           </a:p>
@@ -3102,7 +3106,7 @@
           <a:p>
             <a:fld id="{953266A5-900F-614B-ABA3-875DBE56748E}" type="datetime1">
               <a:rPr lang="en-US" smtClean="0"/>
-              <a:t>12/6/23</a:t>
+              <a:t>1/4/24</a:t>
             </a:fld>
             <a:endParaRPr lang="en-US"/>
           </a:p>
@@ -3735,7 +3739,7 @@
           <p:cNvPr id="2" name="Title 1">
             <a:extLst>
               <a:ext uri="{FF2B5EF4-FFF2-40B4-BE49-F238E27FC236}">
-                <a16:creationId xmlns:a16="http://schemas.microsoft.com/office/drawing/2014/main" id="{72092629-7788-0D2C-452B-E07BE49CE856}"/>
+                <a16:creationId xmlns:a16="http://schemas.microsoft.com/office/drawing/2014/main" id="{CF9D1772-ACCC-A4FE-9FE9-4038ADD2CA92}"/>
               </a:ext>
             </a:extLst>
           </p:cNvPr>
@@ -3746,30 +3750,60 @@
             <p:ph type="title"/>
           </p:nvPr>
         </p:nvSpPr>
+        <p:spPr/>
+        <p:txBody>
+          <a:bodyPr/>
+          <a:lstStyle/>
+          <a:p>
+            <a:r>
+              <a:rPr lang="en-PK" dirty="0"/>
+              <a:t>Unzip the file</a:t>
+            </a:r>
+          </a:p>
+        </p:txBody>
+      </p:sp>
+      <p:pic>
+        <p:nvPicPr>
+          <p:cNvPr id="8" name="Picture 7" descr="A screenshot of a computer&#10;&#10;Description automatically generated">
+            <a:extLst>
+              <a:ext uri="{FF2B5EF4-FFF2-40B4-BE49-F238E27FC236}">
+                <a16:creationId xmlns:a16="http://schemas.microsoft.com/office/drawing/2014/main" id="{BC20B991-CAA7-C823-FE35-C57FA278E85D}"/>
+              </a:ext>
+            </a:extLst>
+          </p:cNvPr>
+          <p:cNvPicPr>
+            <a:picLocks noChangeAspect="1"/>
+          </p:cNvPicPr>
+          <p:nvPr/>
+        </p:nvPicPr>
+        <p:blipFill>
+          <a:blip r:embed="rId2">
+            <a:extLst>
+              <a:ext uri="{28A0092B-C50C-407E-A947-70E740481C1C}">
+                <a14:useLocalDpi xmlns:a14="http://schemas.microsoft.com/office/drawing/2010/main" val="0"/>
+              </a:ext>
+            </a:extLst>
+          </a:blip>
+          <a:stretch>
+            <a:fillRect/>
+          </a:stretch>
+        </p:blipFill>
         <p:spPr>
           <a:xfrm>
-            <a:off x="838200" y="365125"/>
-            <a:ext cx="10515600" cy="1325563"/>
+            <a:off x="1026457" y="2060019"/>
+            <a:ext cx="10004400" cy="3960075"/>
           </a:xfrm>
+          <a:prstGeom prst="rect">
+            <a:avLst/>
+          </a:prstGeom>
         </p:spPr>
-        <p:txBody>
-          <a:bodyPr/>
-          <a:lstStyle/>
-          <a:p>
-            <a:pPr algn="ctr"/>
-            <a:r>
-              <a:rPr lang="en-PK" dirty="0"/>
-              <a:t>Image File Verification</a:t>
-            </a:r>
-          </a:p>
-        </p:txBody>
-      </p:sp>
-      <p:sp>
-        <p:nvSpPr>
-          <p:cNvPr id="7" name="TextBox 6">
+      </p:pic>
+      <p:sp>
+        <p:nvSpPr>
+          <p:cNvPr id="9" name="TextBox 8">
             <a:extLst>
               <a:ext uri="{FF2B5EF4-FFF2-40B4-BE49-F238E27FC236}">
-                <a16:creationId xmlns:a16="http://schemas.microsoft.com/office/drawing/2014/main" id="{662823CB-6AB4-6C9A-B46B-68CFF28C362A}"/>
+                <a16:creationId xmlns:a16="http://schemas.microsoft.com/office/drawing/2014/main" id="{86E88550-4B92-CE7D-30CF-750A497F4D9C}"/>
               </a:ext>
             </a:extLst>
           </p:cNvPr>
@@ -3778,8 +3812,8 @@
         </p:nvSpPr>
         <p:spPr>
           <a:xfrm>
-            <a:off x="838200" y="1690688"/>
-            <a:ext cx="4597400" cy="369332"/>
+            <a:off x="1026457" y="1690688"/>
+            <a:ext cx="2200835" cy="369332"/>
           </a:xfrm>
           <a:prstGeom prst="rect">
             <a:avLst/>
@@ -3796,52 +3830,16 @@
           <a:p>
             <a:r>
               <a:rPr lang="en-GB" dirty="0"/>
-              <a:t>Verification of file hash (checking file integrity)</a:t>
+              <a:t>Extract/Unzip the file</a:t>
             </a:r>
             <a:endParaRPr lang="en-US" dirty="0"/>
           </a:p>
         </p:txBody>
       </p:sp>
-      <p:pic>
-        <p:nvPicPr>
-          <p:cNvPr id="5" name="Picture 4" descr="A screenshot of a computer program&#10;&#10;Description automatically generated">
-            <a:extLst>
-              <a:ext uri="{FF2B5EF4-FFF2-40B4-BE49-F238E27FC236}">
-                <a16:creationId xmlns:a16="http://schemas.microsoft.com/office/drawing/2014/main" id="{98C07CE7-52F6-C772-0CF6-842D4B6A2295}"/>
-              </a:ext>
-            </a:extLst>
-          </p:cNvPr>
-          <p:cNvPicPr>
-            <a:picLocks noChangeAspect="1"/>
-          </p:cNvPicPr>
-          <p:nvPr/>
-        </p:nvPicPr>
-        <p:blipFill>
-          <a:blip r:embed="rId2">
-            <a:extLst>
-              <a:ext uri="{28A0092B-C50C-407E-A947-70E740481C1C}">
-                <a14:useLocalDpi xmlns:a14="http://schemas.microsoft.com/office/drawing/2010/main" val="0"/>
-              </a:ext>
-            </a:extLst>
-          </a:blip>
-          <a:stretch>
-            <a:fillRect/>
-          </a:stretch>
-        </p:blipFill>
-        <p:spPr>
-          <a:xfrm>
-            <a:off x="838199" y="2060020"/>
-            <a:ext cx="10015200" cy="2880188"/>
-          </a:xfrm>
-          <a:prstGeom prst="rect">
-            <a:avLst/>
-          </a:prstGeom>
-        </p:spPr>
-      </p:pic>
     </p:spTree>
     <p:extLst>
       <p:ext uri="{BB962C8B-B14F-4D97-AF65-F5344CB8AC3E}">
-        <p14:creationId xmlns:p14="http://schemas.microsoft.com/office/powerpoint/2010/main" val="94684036"/>
+        <p14:creationId xmlns:p14="http://schemas.microsoft.com/office/powerpoint/2010/main" val="3389313840"/>
       </p:ext>
     </p:extLst>
   </p:cSld>
@@ -3891,7 +3889,7 @@
           <a:p>
             <a:r>
               <a:rPr lang="en-US" dirty="0"/>
-              <a:t>Image Mounting</a:t>
+              <a:t>Image Verification</a:t>
             </a:r>
           </a:p>
         </p:txBody>
@@ -3924,7 +3922,7 @@
     </p:spTree>
     <p:extLst>
       <p:ext uri="{BB962C8B-B14F-4D97-AF65-F5344CB8AC3E}">
-        <p14:creationId xmlns:p14="http://schemas.microsoft.com/office/powerpoint/2010/main" val="64872412"/>
+        <p14:creationId xmlns:p14="http://schemas.microsoft.com/office/powerpoint/2010/main" val="1565627283"/>
       </p:ext>
     </p:extLst>
   </p:cSld>
@@ -3967,25 +3965,29 @@
             <p:ph type="title"/>
           </p:nvPr>
         </p:nvSpPr>
-        <p:spPr/>
+        <p:spPr>
+          <a:xfrm>
+            <a:off x="838200" y="365125"/>
+            <a:ext cx="10515600" cy="1325563"/>
+          </a:xfrm>
+        </p:spPr>
         <p:txBody>
           <a:bodyPr/>
           <a:lstStyle/>
           <a:p>
-            <a:pPr algn="ctr"/>
             <a:r>
               <a:rPr lang="en-PK" dirty="0"/>
-              <a:t>Create Workspace</a:t>
-            </a:r>
-          </a:p>
-        </p:txBody>
-      </p:sp>
-      <p:sp>
-        <p:nvSpPr>
-          <p:cNvPr id="7" name="TextBox 6">
+              <a:t>Image File Verification</a:t>
+            </a:r>
+          </a:p>
+        </p:txBody>
+      </p:sp>
+      <p:sp>
+        <p:nvSpPr>
+          <p:cNvPr id="3" name="TextBox 2">
             <a:extLst>
               <a:ext uri="{FF2B5EF4-FFF2-40B4-BE49-F238E27FC236}">
-                <a16:creationId xmlns:a16="http://schemas.microsoft.com/office/drawing/2014/main" id="{662823CB-6AB4-6C9A-B46B-68CFF28C362A}"/>
+                <a16:creationId xmlns:a16="http://schemas.microsoft.com/office/drawing/2014/main" id="{66664EC8-07A4-D6DF-4CF7-EDE71A526039}"/>
               </a:ext>
             </a:extLst>
           </p:cNvPr>
@@ -3994,8 +3996,69 @@
         </p:nvSpPr>
         <p:spPr>
           <a:xfrm>
-            <a:off x="838200" y="1975136"/>
-            <a:ext cx="4813300" cy="369332"/>
+            <a:off x="838199" y="3841592"/>
+            <a:ext cx="10515599" cy="1200329"/>
+          </a:xfrm>
+          <a:prstGeom prst="rect">
+            <a:avLst/>
+          </a:prstGeom>
+          <a:solidFill>
+            <a:schemeClr val="accent4">
+              <a:lumMod val="20000"/>
+              <a:lumOff val="80000"/>
+            </a:schemeClr>
+          </a:solidFill>
+        </p:spPr>
+        <p:txBody>
+          <a:bodyPr wrap="square" rtlCol="0">
+            <a:spAutoFit/>
+          </a:bodyPr>
+          <a:lstStyle/>
+          <a:p>
+            <a:pPr marL="342900" indent="-342900">
+              <a:buFont typeface="Arial" panose="020B0604020202020204" pitchFamily="34" charset="0"/>
+              <a:buChar char="•"/>
+            </a:pPr>
+            <a:r>
+              <a:rPr lang="en-GB" sz="2400" dirty="0"/>
+              <a:t>The MD5 of the original image file is b58fa04967161c158723c7b00a636533</a:t>
+            </a:r>
+          </a:p>
+          <a:p>
+            <a:pPr marL="342900" indent="-342900">
+              <a:buFont typeface="Arial" panose="020B0604020202020204" pitchFamily="34" charset="0"/>
+              <a:buChar char="•"/>
+            </a:pPr>
+            <a:endParaRPr lang="en-GB" sz="2400" dirty="0"/>
+          </a:p>
+          <a:p>
+            <a:pPr marL="342900" indent="-342900">
+              <a:buFont typeface="Arial" panose="020B0604020202020204" pitchFamily="34" charset="0"/>
+              <a:buChar char="•"/>
+            </a:pPr>
+            <a:r>
+              <a:rPr lang="en-GB" sz="2400" dirty="0"/>
+              <a:t>The calculated md5 of the downloaded image should match</a:t>
+            </a:r>
+          </a:p>
+        </p:txBody>
+      </p:sp>
+      <p:sp>
+        <p:nvSpPr>
+          <p:cNvPr id="4" name="TextBox 3">
+            <a:extLst>
+              <a:ext uri="{FF2B5EF4-FFF2-40B4-BE49-F238E27FC236}">
+                <a16:creationId xmlns:a16="http://schemas.microsoft.com/office/drawing/2014/main" id="{2387C563-EFA1-7922-AEBE-6EFE0E2A00BE}"/>
+              </a:ext>
+            </a:extLst>
+          </p:cNvPr>
+          <p:cNvSpPr txBox="1"/>
+          <p:nvPr/>
+        </p:nvSpPr>
+        <p:spPr>
+          <a:xfrm>
+            <a:off x="838200" y="1690688"/>
+            <a:ext cx="4597400" cy="369332"/>
           </a:xfrm>
           <a:prstGeom prst="rect">
             <a:avLst/>
@@ -4012,7 +4075,7 @@
           <a:p>
             <a:r>
               <a:rPr lang="en-GB" dirty="0"/>
-              <a:t>Create a new directory, go to it and list image file </a:t>
+              <a:t>Verification of file hash (checking file integrity)</a:t>
             </a:r>
             <a:endParaRPr lang="en-US" dirty="0"/>
           </a:p>
@@ -4020,10 +4083,10 @@
       </p:sp>
       <p:pic>
         <p:nvPicPr>
-          <p:cNvPr id="4" name="Picture 3" descr="A screenshot of a computer&#10;&#10;Description automatically generated">
+          <p:cNvPr id="8" name="Picture 7">
             <a:extLst>
               <a:ext uri="{FF2B5EF4-FFF2-40B4-BE49-F238E27FC236}">
-                <a16:creationId xmlns:a16="http://schemas.microsoft.com/office/drawing/2014/main" id="{4E250C3B-66EC-60C4-12BF-1D7A5C77D900}"/>
+                <a16:creationId xmlns:a16="http://schemas.microsoft.com/office/drawing/2014/main" id="{E5E44C4A-EC43-BA5A-5491-25993C39E454}"/>
               </a:ext>
             </a:extLst>
           </p:cNvPr>
@@ -4032,7 +4095,7 @@
           </p:cNvPicPr>
           <p:nvPr/>
         </p:nvPicPr>
-        <p:blipFill rotWithShape="1">
+        <p:blipFill>
           <a:blip r:embed="rId2">
             <a:extLst>
               <a:ext uri="{28A0092B-C50C-407E-A947-70E740481C1C}">
@@ -4040,13 +4103,14 @@
               </a:ext>
             </a:extLst>
           </a:blip>
-          <a:srcRect r="4292"/>
-          <a:stretch/>
+          <a:stretch>
+            <a:fillRect/>
+          </a:stretch>
         </p:blipFill>
         <p:spPr>
           <a:xfrm>
-            <a:off x="838200" y="2344468"/>
-            <a:ext cx="10515600" cy="3239815"/>
+            <a:off x="838199" y="2030673"/>
+            <a:ext cx="10515600" cy="1170133"/>
           </a:xfrm>
           <a:prstGeom prst="rect">
             <a:avLst/>
@@ -4056,7 +4120,7 @@
     </p:spTree>
     <p:extLst>
       <p:ext uri="{BB962C8B-B14F-4D97-AF65-F5344CB8AC3E}">
-        <p14:creationId xmlns:p14="http://schemas.microsoft.com/office/powerpoint/2010/main" val="144480136"/>
+        <p14:creationId xmlns:p14="http://schemas.microsoft.com/office/powerpoint/2010/main" val="94684036"/>
       </p:ext>
     </p:extLst>
   </p:cSld>
@@ -4085,10 +4149,10 @@
       </p:grpSpPr>
       <p:sp>
         <p:nvSpPr>
-          <p:cNvPr id="2" name="Title 1">
+          <p:cNvPr id="4" name="Title 3">
             <a:extLst>
               <a:ext uri="{FF2B5EF4-FFF2-40B4-BE49-F238E27FC236}">
-                <a16:creationId xmlns:a16="http://schemas.microsoft.com/office/drawing/2014/main" id="{EDC9B5B3-F536-FDF1-55DE-6EC5BE763F7D}"/>
+                <a16:creationId xmlns:a16="http://schemas.microsoft.com/office/drawing/2014/main" id="{49C2FCA1-650A-42EA-95A7-7A2FFD015D28}"/>
               </a:ext>
             </a:extLst>
           </p:cNvPr>
@@ -4104,92 +4168,42 @@
           <a:bodyPr/>
           <a:lstStyle/>
           <a:p>
-            <a:pPr algn="ctr"/>
-            <a:r>
-              <a:rPr lang="en-PK" dirty="0"/>
-              <a:t>Setup Loop Device</a:t>
-            </a:r>
-          </a:p>
-        </p:txBody>
-      </p:sp>
-      <p:sp>
-        <p:nvSpPr>
-          <p:cNvPr id="5" name="TextBox 4">
+            <a:r>
+              <a:rPr lang="en-US" dirty="0"/>
+              <a:t>Image Mounting</a:t>
+            </a:r>
+          </a:p>
+        </p:txBody>
+      </p:sp>
+      <p:sp>
+        <p:nvSpPr>
+          <p:cNvPr id="5" name="Text Placeholder 4">
             <a:extLst>
               <a:ext uri="{FF2B5EF4-FFF2-40B4-BE49-F238E27FC236}">
-                <a16:creationId xmlns:a16="http://schemas.microsoft.com/office/drawing/2014/main" id="{5F2F3BF7-FBCD-A111-ADF5-E9968A145F18}"/>
+                <a16:creationId xmlns:a16="http://schemas.microsoft.com/office/drawing/2014/main" id="{4E9A3CBC-D866-46E5-AA37-8D47564F10CA}"/>
               </a:ext>
             </a:extLst>
           </p:cNvPr>
-          <p:cNvSpPr txBox="1"/>
-          <p:nvPr/>
-        </p:nvSpPr>
-        <p:spPr>
-          <a:xfrm>
-            <a:off x="838200" y="1690688"/>
-            <a:ext cx="5981700" cy="369332"/>
-          </a:xfrm>
-          <a:prstGeom prst="rect">
-            <a:avLst/>
-          </a:prstGeom>
-          <a:solidFill>
-            <a:schemeClr val="accent4"/>
-          </a:solidFill>
-        </p:spPr>
-        <p:txBody>
-          <a:bodyPr wrap="square">
-            <a:spAutoFit/>
-          </a:bodyPr>
-          <a:lstStyle/>
-          <a:p>
-            <a:r>
-              <a:rPr lang="en-GB" dirty="0"/>
-              <a:t>Create mount point, setup loop device, verify, list loop devices</a:t>
-            </a:r>
+          <p:cNvSpPr>
+            <a:spLocks noGrp="1"/>
+          </p:cNvSpPr>
+          <p:nvPr>
+            <p:ph type="body" idx="1"/>
+          </p:nvPr>
+        </p:nvSpPr>
+        <p:spPr/>
+        <p:txBody>
+          <a:bodyPr/>
+          <a:lstStyle/>
+          <a:p>
             <a:endParaRPr lang="en-US" dirty="0"/>
           </a:p>
         </p:txBody>
       </p:sp>
-      <p:pic>
-        <p:nvPicPr>
-          <p:cNvPr id="8" name="Picture 7" descr="A screenshot of a computer program&#10;&#10;Description automatically generated">
-            <a:extLst>
-              <a:ext uri="{FF2B5EF4-FFF2-40B4-BE49-F238E27FC236}">
-                <a16:creationId xmlns:a16="http://schemas.microsoft.com/office/drawing/2014/main" id="{71EBDE47-ACA0-C5A1-AA52-C92BA2C5DA66}"/>
-              </a:ext>
-            </a:extLst>
-          </p:cNvPr>
-          <p:cNvPicPr>
-            <a:picLocks noChangeAspect="1"/>
-          </p:cNvPicPr>
-          <p:nvPr/>
-        </p:nvPicPr>
-        <p:blipFill>
-          <a:blip r:embed="rId2">
-            <a:extLst>
-              <a:ext uri="{28A0092B-C50C-407E-A947-70E740481C1C}">
-                <a14:useLocalDpi xmlns:a14="http://schemas.microsoft.com/office/drawing/2010/main" val="0"/>
-              </a:ext>
-            </a:extLst>
-          </a:blip>
-          <a:stretch>
-            <a:fillRect/>
-          </a:stretch>
-        </p:blipFill>
-        <p:spPr>
-          <a:xfrm>
-            <a:off x="838199" y="2060019"/>
-            <a:ext cx="10594800" cy="3600576"/>
-          </a:xfrm>
-          <a:prstGeom prst="rect">
-            <a:avLst/>
-          </a:prstGeom>
-        </p:spPr>
-      </p:pic>
     </p:spTree>
     <p:extLst>
       <p:ext uri="{BB962C8B-B14F-4D97-AF65-F5344CB8AC3E}">
-        <p14:creationId xmlns:p14="http://schemas.microsoft.com/office/powerpoint/2010/main" val="682761566"/>
+        <p14:creationId xmlns:p14="http://schemas.microsoft.com/office/powerpoint/2010/main" val="64872412"/>
       </p:ext>
     </p:extLst>
   </p:cSld>
@@ -4218,10 +4232,10 @@
       </p:grpSpPr>
       <p:sp>
         <p:nvSpPr>
-          <p:cNvPr id="2" name="Title 1">
+          <p:cNvPr id="4" name="Title 3">
             <a:extLst>
               <a:ext uri="{FF2B5EF4-FFF2-40B4-BE49-F238E27FC236}">
-                <a16:creationId xmlns:a16="http://schemas.microsoft.com/office/drawing/2014/main" id="{EDC9B5B3-F536-FDF1-55DE-6EC5BE763F7D}"/>
+                <a16:creationId xmlns:a16="http://schemas.microsoft.com/office/drawing/2014/main" id="{8301097B-3429-36B7-BEBE-F2279715C779}"/>
               </a:ext>
             </a:extLst>
           </p:cNvPr>
@@ -4232,172 +4246,155 @@
             <p:ph type="title"/>
           </p:nvPr>
         </p:nvSpPr>
-        <p:spPr>
-          <a:xfrm>
-            <a:off x="838200" y="365125"/>
-            <a:ext cx="10515600" cy="1325563"/>
-          </a:xfrm>
-        </p:spPr>
+        <p:spPr/>
         <p:txBody>
           <a:bodyPr/>
           <a:lstStyle/>
           <a:p>
-            <a:pPr algn="ctr"/>
             <a:r>
               <a:rPr lang="en-PK" dirty="0"/>
-              <a:t>Check Partition Numbers of Block Devices</a:t>
-            </a:r>
-          </a:p>
-        </p:txBody>
-      </p:sp>
-      <p:sp>
-        <p:nvSpPr>
-          <p:cNvPr id="5" name="TextBox 4">
+              <a:t>Block and Loop Devices</a:t>
+            </a:r>
+          </a:p>
+        </p:txBody>
+      </p:sp>
+      <p:sp>
+        <p:nvSpPr>
+          <p:cNvPr id="5" name="Content Placeholder 4">
             <a:extLst>
               <a:ext uri="{FF2B5EF4-FFF2-40B4-BE49-F238E27FC236}">
-                <a16:creationId xmlns:a16="http://schemas.microsoft.com/office/drawing/2014/main" id="{5F2F3BF7-FBCD-A111-ADF5-E9968A145F18}"/>
+                <a16:creationId xmlns:a16="http://schemas.microsoft.com/office/drawing/2014/main" id="{DF54055E-DD1B-6EAB-47CC-C8AB470A1EDB}"/>
               </a:ext>
             </a:extLst>
           </p:cNvPr>
-          <p:cNvSpPr txBox="1"/>
-          <p:nvPr/>
-        </p:nvSpPr>
-        <p:spPr>
-          <a:xfrm>
-            <a:off x="838200" y="1690688"/>
-            <a:ext cx="1790700" cy="369332"/>
-          </a:xfrm>
-          <a:prstGeom prst="rect">
-            <a:avLst/>
-          </a:prstGeom>
-          <a:solidFill>
-            <a:schemeClr val="accent4"/>
-          </a:solidFill>
-        </p:spPr>
-        <p:txBody>
-          <a:bodyPr wrap="square">
-            <a:spAutoFit/>
+          <p:cNvSpPr>
+            <a:spLocks noGrp="1"/>
+          </p:cNvSpPr>
+          <p:nvPr>
+            <p:ph idx="1"/>
+          </p:nvPr>
+        </p:nvSpPr>
+        <p:spPr/>
+        <p:txBody>
+          <a:bodyPr>
+            <a:normAutofit fontScale="92500"/>
           </a:bodyPr>
           <a:lstStyle/>
           <a:p>
+            <a:pPr>
+              <a:lnSpc>
+                <a:spcPct val="100000"/>
+              </a:lnSpc>
+            </a:pPr>
             <a:r>
               <a:rPr lang="en-GB" dirty="0"/>
-              <a:t>List loop devices</a:t>
-            </a:r>
-            <a:endParaRPr lang="en-US" dirty="0"/>
-          </a:p>
-        </p:txBody>
-      </p:sp>
-      <p:pic>
-        <p:nvPicPr>
-          <p:cNvPr id="8" name="Picture 7" descr="A screenshot of a computer&#10;&#10;Description automatically generated">
-            <a:extLst>
-              <a:ext uri="{FF2B5EF4-FFF2-40B4-BE49-F238E27FC236}">
-                <a16:creationId xmlns:a16="http://schemas.microsoft.com/office/drawing/2014/main" id="{9C9E685C-0ED4-8915-805F-AF50ECE746DB}"/>
-              </a:ext>
-            </a:extLst>
-          </p:cNvPr>
-          <p:cNvPicPr>
-            <a:picLocks noChangeAspect="1"/>
-          </p:cNvPicPr>
-          <p:nvPr/>
-        </p:nvPicPr>
-        <p:blipFill rotWithShape="1">
-          <a:blip r:embed="rId3">
-            <a:extLst>
-              <a:ext uri="{28A0092B-C50C-407E-A947-70E740481C1C}">
-                <a14:useLocalDpi xmlns:a14="http://schemas.microsoft.com/office/drawing/2010/main" val="0"/>
-              </a:ext>
-            </a:extLst>
-          </a:blip>
-          <a:srcRect b="21973"/>
-          <a:stretch/>
-        </p:blipFill>
-        <p:spPr>
-          <a:xfrm>
-            <a:off x="838200" y="2060020"/>
-            <a:ext cx="6781800" cy="4132233"/>
-          </a:xfrm>
-          <a:prstGeom prst="rect">
-            <a:avLst/>
-          </a:prstGeom>
-        </p:spPr>
-      </p:pic>
-      <p:pic>
-        <p:nvPicPr>
-          <p:cNvPr id="10" name="Picture 9" descr="A screenshot of a computer&#10;&#10;Description automatically generated">
-            <a:extLst>
-              <a:ext uri="{FF2B5EF4-FFF2-40B4-BE49-F238E27FC236}">
-                <a16:creationId xmlns:a16="http://schemas.microsoft.com/office/drawing/2014/main" id="{0F823E1F-B101-8B9B-29FD-639FF5784F82}"/>
-              </a:ext>
-            </a:extLst>
-          </p:cNvPr>
-          <p:cNvPicPr>
-            <a:picLocks noChangeAspect="1"/>
-          </p:cNvPicPr>
-          <p:nvPr/>
-        </p:nvPicPr>
-        <p:blipFill rotWithShape="1">
-          <a:blip r:embed="rId3">
-            <a:extLst>
-              <a:ext uri="{28A0092B-C50C-407E-A947-70E740481C1C}">
-                <a14:useLocalDpi xmlns:a14="http://schemas.microsoft.com/office/drawing/2010/main" val="0"/>
-              </a:ext>
-            </a:extLst>
-          </a:blip>
-          <a:srcRect t="78122" r="-9551"/>
-          <a:stretch/>
-        </p:blipFill>
-        <p:spPr>
-          <a:xfrm>
-            <a:off x="4746457" y="3561346"/>
-            <a:ext cx="7429499" cy="1158655"/>
-          </a:xfrm>
-          <a:prstGeom prst="rect">
-            <a:avLst/>
-          </a:prstGeom>
-        </p:spPr>
-      </p:pic>
-      <p:pic>
-        <p:nvPicPr>
-          <p:cNvPr id="12" name="Picture 11" descr="A screen shot of a computer&#10;&#10;Description automatically generated">
-            <a:extLst>
-              <a:ext uri="{FF2B5EF4-FFF2-40B4-BE49-F238E27FC236}">
-                <a16:creationId xmlns:a16="http://schemas.microsoft.com/office/drawing/2014/main" id="{CE069D3C-6C94-8807-4910-85C0B2FFDD50}"/>
-              </a:ext>
-            </a:extLst>
-          </p:cNvPr>
-          <p:cNvPicPr>
-            <a:picLocks noChangeAspect="1"/>
-          </p:cNvPicPr>
-          <p:nvPr/>
-        </p:nvPicPr>
-        <p:blipFill>
-          <a:blip r:embed="rId4">
-            <a:extLst>
-              <a:ext uri="{28A0092B-C50C-407E-A947-70E740481C1C}">
-                <a14:useLocalDpi xmlns:a14="http://schemas.microsoft.com/office/drawing/2010/main" val="0"/>
-              </a:ext>
-            </a:extLst>
-          </a:blip>
-          <a:stretch>
-            <a:fillRect/>
-          </a:stretch>
-        </p:blipFill>
-        <p:spPr>
-          <a:xfrm>
-            <a:off x="4762500" y="4592053"/>
-            <a:ext cx="7429500" cy="1600200"/>
-          </a:xfrm>
-          <a:prstGeom prst="rect">
-            <a:avLst/>
-          </a:prstGeom>
-        </p:spPr>
-      </p:pic>
+              <a:t>Block Device</a:t>
+            </a:r>
+          </a:p>
+          <a:p>
+            <a:pPr marL="685800" lvl="2">
+              <a:lnSpc>
+                <a:spcPct val="100000"/>
+              </a:lnSpc>
+              <a:spcBef>
+                <a:spcPts val="1000"/>
+              </a:spcBef>
+            </a:pPr>
+            <a:r>
+              <a:rPr lang="en-GB" sz="2400" dirty="0"/>
+              <a:t>A storage device that supports reading and writing data in fixed-size blocks. </a:t>
+            </a:r>
+          </a:p>
+          <a:p>
+            <a:pPr marL="685800" lvl="2">
+              <a:lnSpc>
+                <a:spcPct val="100000"/>
+              </a:lnSpc>
+              <a:spcBef>
+                <a:spcPts val="1000"/>
+              </a:spcBef>
+            </a:pPr>
+            <a:r>
+              <a:rPr lang="en-GB" sz="2400" dirty="0"/>
+              <a:t>These blocks are typically 512 bytes or larger.</a:t>
+            </a:r>
+          </a:p>
+          <a:p>
+            <a:pPr marL="685800" lvl="2">
+              <a:lnSpc>
+                <a:spcPct val="100000"/>
+              </a:lnSpc>
+              <a:spcBef>
+                <a:spcPts val="1000"/>
+              </a:spcBef>
+            </a:pPr>
+            <a:r>
+              <a:rPr lang="en-GB" sz="2400" dirty="0"/>
+              <a:t>Examples: Hard drives, SSDs, USB drives, and disk images. </a:t>
+            </a:r>
+          </a:p>
+          <a:p>
+            <a:pPr>
+              <a:lnSpc>
+                <a:spcPct val="100000"/>
+              </a:lnSpc>
+            </a:pPr>
+            <a:r>
+              <a:rPr lang="en-GB" dirty="0"/>
+              <a:t>Loop Device</a:t>
+            </a:r>
+          </a:p>
+          <a:p>
+            <a:pPr marL="685800" lvl="2">
+              <a:lnSpc>
+                <a:spcPct val="100000"/>
+              </a:lnSpc>
+              <a:spcBef>
+                <a:spcPts val="1000"/>
+              </a:spcBef>
+            </a:pPr>
+            <a:r>
+              <a:rPr lang="en-GB" sz="2400" dirty="0"/>
+              <a:t>A pseudo-device that makes a file accessible as a block device. </a:t>
+            </a:r>
+          </a:p>
+          <a:p>
+            <a:pPr marL="685800" lvl="2">
+              <a:lnSpc>
+                <a:spcPct val="100000"/>
+              </a:lnSpc>
+              <a:spcBef>
+                <a:spcPts val="1000"/>
+              </a:spcBef>
+            </a:pPr>
+            <a:r>
+              <a:rPr lang="en-GB" sz="2400" dirty="0"/>
+              <a:t>In simpler terms, it allows a file (such as a disk image) to be treated as a block device.</a:t>
+            </a:r>
+          </a:p>
+          <a:p>
+            <a:pPr marL="685800" lvl="2">
+              <a:lnSpc>
+                <a:spcPct val="100000"/>
+              </a:lnSpc>
+              <a:spcBef>
+                <a:spcPts val="1000"/>
+              </a:spcBef>
+            </a:pPr>
+            <a:r>
+              <a:rPr lang="en-GB" sz="2400" dirty="0"/>
+              <a:t>Loop devices are often used for mounting disk images, allowing the system to interact with the contents of the file as if it were a physical disk.</a:t>
+            </a:r>
+          </a:p>
+          <a:p>
+            <a:endParaRPr lang="en-PK" dirty="0"/>
+          </a:p>
+        </p:txBody>
+      </p:sp>
     </p:spTree>
     <p:extLst>
       <p:ext uri="{BB962C8B-B14F-4D97-AF65-F5344CB8AC3E}">
-        <p14:creationId xmlns:p14="http://schemas.microsoft.com/office/powerpoint/2010/main" val="3839354834"/>
+        <p14:creationId xmlns:p14="http://schemas.microsoft.com/office/powerpoint/2010/main" val="1046406551"/>
       </p:ext>
     </p:extLst>
   </p:cSld>
@@ -4429,6 +4426,139 @@
           <p:cNvPr id="2" name="Title 1">
             <a:extLst>
               <a:ext uri="{FF2B5EF4-FFF2-40B4-BE49-F238E27FC236}">
+                <a16:creationId xmlns:a16="http://schemas.microsoft.com/office/drawing/2014/main" id="{84E2D927-CE57-D6F9-95B2-5DC06177E4CA}"/>
+              </a:ext>
+            </a:extLst>
+          </p:cNvPr>
+          <p:cNvSpPr>
+            <a:spLocks noGrp="1"/>
+          </p:cNvSpPr>
+          <p:nvPr>
+            <p:ph type="title"/>
+          </p:nvPr>
+        </p:nvSpPr>
+        <p:spPr/>
+        <p:txBody>
+          <a:bodyPr/>
+          <a:lstStyle/>
+          <a:p>
+            <a:r>
+              <a:rPr lang="en-PK" dirty="0"/>
+              <a:t>The Mounting Process Explained</a:t>
+            </a:r>
+          </a:p>
+        </p:txBody>
+      </p:sp>
+      <p:sp>
+        <p:nvSpPr>
+          <p:cNvPr id="3" name="Content Placeholder 2">
+            <a:extLst>
+              <a:ext uri="{FF2B5EF4-FFF2-40B4-BE49-F238E27FC236}">
+                <a16:creationId xmlns:a16="http://schemas.microsoft.com/office/drawing/2014/main" id="{9BC78143-0248-3167-91F3-57D817379A57}"/>
+              </a:ext>
+            </a:extLst>
+          </p:cNvPr>
+          <p:cNvSpPr>
+            <a:spLocks noGrp="1"/>
+          </p:cNvSpPr>
+          <p:nvPr>
+            <p:ph idx="1"/>
+          </p:nvPr>
+        </p:nvSpPr>
+        <p:spPr/>
+        <p:txBody>
+          <a:bodyPr>
+            <a:normAutofit fontScale="92500" lnSpcReduction="20000"/>
+          </a:bodyPr>
+          <a:lstStyle/>
+          <a:p>
+            <a:pPr>
+              <a:lnSpc>
+                <a:spcPct val="110000"/>
+              </a:lnSpc>
+            </a:pPr>
+            <a:r>
+              <a:rPr lang="en-GB" sz="3000" dirty="0"/>
+              <a:t>Disk images are essentially files that contain a representation of an entire file system. </a:t>
+            </a:r>
+          </a:p>
+          <a:p>
+            <a:pPr>
+              <a:lnSpc>
+                <a:spcPct val="110000"/>
+              </a:lnSpc>
+            </a:pPr>
+            <a:r>
+              <a:rPr lang="en-GB" sz="3000" dirty="0"/>
+              <a:t>However, the OS treats them as regular files initially.</a:t>
+            </a:r>
+          </a:p>
+          <a:p>
+            <a:pPr>
+              <a:lnSpc>
+                <a:spcPct val="110000"/>
+              </a:lnSpc>
+            </a:pPr>
+            <a:r>
+              <a:rPr lang="en-GB" sz="3000" dirty="0"/>
+              <a:t>To interact with this file system within the disk image, it must be associated with a block device.</a:t>
+            </a:r>
+          </a:p>
+          <a:p>
+            <a:r>
+              <a:rPr lang="en-GB" dirty="0"/>
+              <a:t>Loop devices acts as the bridge between the file system in the disk image and the OS.</a:t>
+            </a:r>
+          </a:p>
+          <a:p>
+            <a:r>
+              <a:rPr lang="en-GB" dirty="0"/>
+              <a:t>By setting up the disk image as a loop device, the OS can treat it as if it were a physical device.</a:t>
+            </a:r>
+          </a:p>
+          <a:p>
+            <a:r>
+              <a:rPr lang="en-GB" dirty="0"/>
+              <a:t>Thus, mount disk image to a directory and access its contents as if it were a separate disk.</a:t>
+            </a:r>
+          </a:p>
+        </p:txBody>
+      </p:sp>
+    </p:spTree>
+    <p:extLst>
+      <p:ext uri="{BB962C8B-B14F-4D97-AF65-F5344CB8AC3E}">
+        <p14:creationId xmlns:p14="http://schemas.microsoft.com/office/powerpoint/2010/main" val="3650892113"/>
+      </p:ext>
+    </p:extLst>
+  </p:cSld>
+  <p:clrMapOvr>
+    <a:masterClrMapping/>
+  </p:clrMapOvr>
+</p:sld>
+</file>
+
+<file path=ppt/slides/slide16.xml><?xml version="1.0" encoding="utf-8"?>
+<p:sld xmlns:a="http://schemas.openxmlformats.org/drawingml/2006/main" xmlns:r="http://schemas.openxmlformats.org/officeDocument/2006/relationships" xmlns:p="http://schemas.openxmlformats.org/presentationml/2006/main">
+  <p:cSld>
+    <p:spTree>
+      <p:nvGrpSpPr>
+        <p:cNvPr id="1" name=""/>
+        <p:cNvGrpSpPr/>
+        <p:nvPr/>
+      </p:nvGrpSpPr>
+      <p:grpSpPr>
+        <a:xfrm>
+          <a:off x="0" y="0"/>
+          <a:ext cx="0" cy="0"/>
+          <a:chOff x="0" y="0"/>
+          <a:chExt cx="0" cy="0"/>
+        </a:xfrm>
+      </p:grpSpPr>
+      <p:sp>
+        <p:nvSpPr>
+          <p:cNvPr id="2" name="Title 1">
+            <a:extLst>
+              <a:ext uri="{FF2B5EF4-FFF2-40B4-BE49-F238E27FC236}">
                 <a16:creationId xmlns:a16="http://schemas.microsoft.com/office/drawing/2014/main" id="{EDC9B5B3-F536-FDF1-55DE-6EC5BE763F7D}"/>
               </a:ext>
             </a:extLst>
@@ -4445,7 +4575,783 @@
           <a:bodyPr/>
           <a:lstStyle/>
           <a:p>
-            <a:pPr algn="ctr"/>
+            <a:r>
+              <a:rPr lang="en-PK" dirty="0"/>
+              <a:t>Setup Loop Device</a:t>
+            </a:r>
+          </a:p>
+        </p:txBody>
+      </p:sp>
+      <p:sp>
+        <p:nvSpPr>
+          <p:cNvPr id="5" name="TextBox 4">
+            <a:extLst>
+              <a:ext uri="{FF2B5EF4-FFF2-40B4-BE49-F238E27FC236}">
+                <a16:creationId xmlns:a16="http://schemas.microsoft.com/office/drawing/2014/main" id="{5F2F3BF7-FBCD-A111-ADF5-E9968A145F18}"/>
+              </a:ext>
+            </a:extLst>
+          </p:cNvPr>
+          <p:cNvSpPr txBox="1"/>
+          <p:nvPr/>
+        </p:nvSpPr>
+        <p:spPr>
+          <a:xfrm>
+            <a:off x="838200" y="1690688"/>
+            <a:ext cx="5697071" cy="369332"/>
+          </a:xfrm>
+          <a:prstGeom prst="rect">
+            <a:avLst/>
+          </a:prstGeom>
+          <a:solidFill>
+            <a:schemeClr val="accent4"/>
+          </a:solidFill>
+        </p:spPr>
+        <p:txBody>
+          <a:bodyPr wrap="square">
+            <a:spAutoFit/>
+          </a:bodyPr>
+          <a:lstStyle/>
+          <a:p>
+            <a:r>
+              <a:rPr lang="en-GB" dirty="0"/>
+              <a:t>Create mount point, setup loop device &amp; verify loop device</a:t>
+            </a:r>
+            <a:endParaRPr lang="en-US" dirty="0"/>
+          </a:p>
+        </p:txBody>
+      </p:sp>
+      <p:grpSp>
+        <p:nvGrpSpPr>
+          <p:cNvPr id="11" name="Group 10">
+            <a:extLst>
+              <a:ext uri="{FF2B5EF4-FFF2-40B4-BE49-F238E27FC236}">
+                <a16:creationId xmlns:a16="http://schemas.microsoft.com/office/drawing/2014/main" id="{2050DFF1-DD1F-7D23-A499-77690DFB4C8D}"/>
+              </a:ext>
+            </a:extLst>
+          </p:cNvPr>
+          <p:cNvGrpSpPr/>
+          <p:nvPr/>
+        </p:nvGrpSpPr>
+        <p:grpSpPr>
+          <a:xfrm>
+            <a:off x="838163" y="2060020"/>
+            <a:ext cx="10440000" cy="1833175"/>
+            <a:chOff x="838200" y="2060020"/>
+            <a:chExt cx="10440000" cy="1833175"/>
+          </a:xfrm>
+        </p:grpSpPr>
+        <p:pic>
+          <p:nvPicPr>
+            <p:cNvPr id="4" name="Picture 3" descr="A screenshot of a computer&#10;&#10;Description automatically generated">
+              <a:extLst>
+                <a:ext uri="{FF2B5EF4-FFF2-40B4-BE49-F238E27FC236}">
+                  <a16:creationId xmlns:a16="http://schemas.microsoft.com/office/drawing/2014/main" id="{716DF0B6-FA57-35DF-7B4E-B17174EEF6D5}"/>
+                </a:ext>
+              </a:extLst>
+            </p:cNvPr>
+            <p:cNvPicPr>
+              <a:picLocks noChangeAspect="1"/>
+            </p:cNvPicPr>
+            <p:nvPr/>
+          </p:nvPicPr>
+          <p:blipFill>
+            <a:blip r:embed="rId2">
+              <a:extLst>
+                <a:ext uri="{28A0092B-C50C-407E-A947-70E740481C1C}">
+                  <a14:useLocalDpi xmlns:a14="http://schemas.microsoft.com/office/drawing/2010/main" val="0"/>
+                </a:ext>
+              </a:extLst>
+            </a:blip>
+            <a:stretch>
+              <a:fillRect/>
+            </a:stretch>
+          </p:blipFill>
+          <p:spPr>
+            <a:xfrm>
+              <a:off x="838200" y="2060020"/>
+              <a:ext cx="10440000" cy="1833175"/>
+            </a:xfrm>
+            <a:prstGeom prst="rect">
+              <a:avLst/>
+            </a:prstGeom>
+          </p:spPr>
+        </p:pic>
+        <p:sp>
+          <p:nvSpPr>
+            <p:cNvPr id="6" name="Rectangle 5">
+              <a:extLst>
+                <a:ext uri="{FF2B5EF4-FFF2-40B4-BE49-F238E27FC236}">
+                  <a16:creationId xmlns:a16="http://schemas.microsoft.com/office/drawing/2014/main" id="{12627BAA-FCCD-FED7-E6F1-DFD37C724928}"/>
+                </a:ext>
+              </a:extLst>
+            </p:cNvPr>
+            <p:cNvSpPr/>
+            <p:nvPr/>
+          </p:nvSpPr>
+          <p:spPr>
+            <a:xfrm>
+              <a:off x="851647" y="3213847"/>
+              <a:ext cx="7445188" cy="215153"/>
+            </a:xfrm>
+            <a:prstGeom prst="rect">
+              <a:avLst/>
+            </a:prstGeom>
+            <a:noFill/>
+            <a:ln w="19050">
+              <a:solidFill>
+                <a:srgbClr val="FFFF00"/>
+              </a:solidFill>
+            </a:ln>
+          </p:spPr>
+          <p:style>
+            <a:lnRef idx="2">
+              <a:schemeClr val="accent1">
+                <a:shade val="15000"/>
+              </a:schemeClr>
+            </a:lnRef>
+            <a:fillRef idx="1">
+              <a:schemeClr val="accent1"/>
+            </a:fillRef>
+            <a:effectRef idx="0">
+              <a:schemeClr val="accent1"/>
+            </a:effectRef>
+            <a:fontRef idx="minor">
+              <a:schemeClr val="lt1"/>
+            </a:fontRef>
+          </p:style>
+          <p:txBody>
+            <a:bodyPr rtlCol="0" anchor="ctr"/>
+            <a:lstStyle/>
+            <a:p>
+              <a:pPr algn="ctr"/>
+              <a:endParaRPr lang="en-PK"/>
+            </a:p>
+          </p:txBody>
+        </p:sp>
+        <p:sp>
+          <p:nvSpPr>
+            <p:cNvPr id="7" name="TextBox 6">
+              <a:extLst>
+                <a:ext uri="{FF2B5EF4-FFF2-40B4-BE49-F238E27FC236}">
+                  <a16:creationId xmlns:a16="http://schemas.microsoft.com/office/drawing/2014/main" id="{A6EED466-4E36-64B2-F980-2209906B4535}"/>
+                </a:ext>
+              </a:extLst>
+            </p:cNvPr>
+            <p:cNvSpPr txBox="1"/>
+            <p:nvPr/>
+          </p:nvSpPr>
+          <p:spPr>
+            <a:xfrm>
+              <a:off x="4741767" y="3554641"/>
+              <a:ext cx="3587008" cy="338554"/>
+            </a:xfrm>
+            <a:prstGeom prst="rect">
+              <a:avLst/>
+            </a:prstGeom>
+            <a:noFill/>
+          </p:spPr>
+          <p:txBody>
+            <a:bodyPr wrap="none" rtlCol="0">
+              <a:spAutoFit/>
+            </a:bodyPr>
+            <a:lstStyle/>
+            <a:p>
+              <a:r>
+                <a:rPr lang="en-GB" sz="1600" dirty="0">
+                  <a:solidFill>
+                    <a:srgbClr val="FFFF00"/>
+                  </a:solidFill>
+                </a:rPr>
+                <a:t>The loop</a:t>
+              </a:r>
+              <a:r>
+                <a:rPr lang="en-PK" sz="1600" dirty="0">
+                  <a:solidFill>
+                    <a:srgbClr val="FFFF00"/>
+                  </a:solidFill>
+                </a:rPr>
+                <a:t> device has been </a:t>
+              </a:r>
+              <a:r>
+                <a:rPr lang="en-GB" sz="1600" dirty="0">
+                  <a:solidFill>
+                    <a:srgbClr val="FFFF00"/>
+                  </a:solidFill>
+                </a:rPr>
+                <a:t>set</a:t>
+              </a:r>
+              <a:r>
+                <a:rPr lang="en-PK" sz="1600" dirty="0">
+                  <a:solidFill>
+                    <a:srgbClr val="FFFF00"/>
+                  </a:solidFill>
+                </a:rPr>
+                <a:t> up at loop0</a:t>
+              </a:r>
+            </a:p>
+          </p:txBody>
+        </p:sp>
+        <p:cxnSp>
+          <p:nvCxnSpPr>
+            <p:cNvPr id="10" name="Straight Arrow Connector 9">
+              <a:extLst>
+                <a:ext uri="{FF2B5EF4-FFF2-40B4-BE49-F238E27FC236}">
+                  <a16:creationId xmlns:a16="http://schemas.microsoft.com/office/drawing/2014/main" id="{829488B7-560F-20A4-535A-7F1E38D63CE6}"/>
+                </a:ext>
+              </a:extLst>
+            </p:cNvPr>
+            <p:cNvCxnSpPr/>
+            <p:nvPr/>
+          </p:nvCxnSpPr>
+          <p:spPr>
+            <a:xfrm flipH="1" flipV="1">
+              <a:off x="4020671" y="3429000"/>
+              <a:ext cx="699247" cy="295835"/>
+            </a:xfrm>
+            <a:prstGeom prst="straightConnector1">
+              <a:avLst/>
+            </a:prstGeom>
+            <a:ln w="28575">
+              <a:solidFill>
+                <a:srgbClr val="FFFF00"/>
+              </a:solidFill>
+              <a:tailEnd type="triangle"/>
+            </a:ln>
+          </p:spPr>
+          <p:style>
+            <a:lnRef idx="1">
+              <a:schemeClr val="accent1"/>
+            </a:lnRef>
+            <a:fillRef idx="0">
+              <a:schemeClr val="accent1"/>
+            </a:fillRef>
+            <a:effectRef idx="0">
+              <a:schemeClr val="accent1"/>
+            </a:effectRef>
+            <a:fontRef idx="minor">
+              <a:schemeClr val="tx1"/>
+            </a:fontRef>
+          </p:style>
+        </p:cxnSp>
+      </p:grpSp>
+      <p:sp>
+        <p:nvSpPr>
+          <p:cNvPr id="12" name="TextBox 11">
+            <a:extLst>
+              <a:ext uri="{FF2B5EF4-FFF2-40B4-BE49-F238E27FC236}">
+                <a16:creationId xmlns:a16="http://schemas.microsoft.com/office/drawing/2014/main" id="{D4C42409-B481-70DA-212C-8BC57968C74A}"/>
+              </a:ext>
+            </a:extLst>
+          </p:cNvPr>
+          <p:cNvSpPr txBox="1"/>
+          <p:nvPr/>
+        </p:nvSpPr>
+        <p:spPr>
+          <a:xfrm>
+            <a:off x="838200" y="4077526"/>
+            <a:ext cx="10515599" cy="1938992"/>
+          </a:xfrm>
+          <a:prstGeom prst="rect">
+            <a:avLst/>
+          </a:prstGeom>
+          <a:solidFill>
+            <a:schemeClr val="accent4">
+              <a:lumMod val="20000"/>
+              <a:lumOff val="80000"/>
+            </a:schemeClr>
+          </a:solidFill>
+        </p:spPr>
+        <p:txBody>
+          <a:bodyPr wrap="square" rtlCol="0">
+            <a:spAutoFit/>
+          </a:bodyPr>
+          <a:lstStyle/>
+          <a:p>
+            <a:pPr marL="342900" indent="-342900">
+              <a:buFont typeface="Arial" panose="020B0604020202020204" pitchFamily="34" charset="0"/>
+              <a:buChar char="•"/>
+            </a:pPr>
+            <a:r>
+              <a:rPr lang="en-GB" sz="2000" b="1" dirty="0" err="1"/>
+              <a:t>sudo</a:t>
+            </a:r>
+            <a:r>
+              <a:rPr lang="en-GB" sz="2000" b="1" dirty="0"/>
+              <a:t>:</a:t>
+            </a:r>
+            <a:r>
+              <a:rPr lang="en-GB" sz="2000" dirty="0"/>
+              <a:t> root privilege</a:t>
+            </a:r>
+          </a:p>
+          <a:p>
+            <a:pPr marL="342900" indent="-342900">
+              <a:buFont typeface="Arial" panose="020B0604020202020204" pitchFamily="34" charset="0"/>
+              <a:buChar char="•"/>
+            </a:pPr>
+            <a:r>
+              <a:rPr lang="en-GB" sz="2000" b="1" dirty="0" err="1"/>
+              <a:t>losetup</a:t>
+            </a:r>
+            <a:r>
+              <a:rPr lang="en-GB" sz="2000" b="1" dirty="0"/>
+              <a:t>:</a:t>
+            </a:r>
+            <a:r>
+              <a:rPr lang="en-GB" sz="2000" dirty="0"/>
+              <a:t> Command to set up loop devices.</a:t>
+            </a:r>
+          </a:p>
+          <a:p>
+            <a:pPr marL="342900" indent="-342900">
+              <a:buFont typeface="Arial" panose="020B0604020202020204" pitchFamily="34" charset="0"/>
+              <a:buChar char="•"/>
+            </a:pPr>
+            <a:r>
+              <a:rPr lang="en-GB" sz="2000" b="1" dirty="0"/>
+              <a:t>--</a:t>
+            </a:r>
+            <a:r>
+              <a:rPr lang="en-GB" sz="2000" b="1" dirty="0" err="1"/>
+              <a:t>partscan</a:t>
+            </a:r>
+            <a:r>
+              <a:rPr lang="en-GB" sz="2000" b="1" dirty="0"/>
+              <a:t>:</a:t>
+            </a:r>
+            <a:r>
+              <a:rPr lang="en-GB" sz="2000" dirty="0"/>
+              <a:t> This option tells </a:t>
+            </a:r>
+            <a:r>
+              <a:rPr lang="en-GB" sz="2000" dirty="0" err="1"/>
+              <a:t>losetup</a:t>
+            </a:r>
+            <a:r>
+              <a:rPr lang="en-GB" sz="2000" dirty="0"/>
+              <a:t> to scan partitions on the device. </a:t>
+            </a:r>
+          </a:p>
+          <a:p>
+            <a:pPr marL="342900" indent="-342900">
+              <a:buFont typeface="Arial" panose="020B0604020202020204" pitchFamily="34" charset="0"/>
+              <a:buChar char="•"/>
+            </a:pPr>
+            <a:r>
+              <a:rPr lang="en-GB" sz="2000" b="1" dirty="0"/>
+              <a:t>--find:</a:t>
+            </a:r>
+            <a:r>
+              <a:rPr lang="en-GB" sz="2000" dirty="0"/>
+              <a:t> This option instructs </a:t>
+            </a:r>
+            <a:r>
+              <a:rPr lang="en-GB" sz="2000" dirty="0" err="1"/>
+              <a:t>losetup</a:t>
+            </a:r>
+            <a:r>
+              <a:rPr lang="en-GB" sz="2000" dirty="0"/>
+              <a:t> to find the first available loop device automatically.</a:t>
+            </a:r>
+          </a:p>
+          <a:p>
+            <a:pPr marL="342900" indent="-342900">
+              <a:buFont typeface="Arial" panose="020B0604020202020204" pitchFamily="34" charset="0"/>
+              <a:buChar char="•"/>
+            </a:pPr>
+            <a:r>
+              <a:rPr lang="en-GB" sz="2000" b="1" dirty="0"/>
+              <a:t>--show:</a:t>
+            </a:r>
+            <a:r>
+              <a:rPr lang="en-GB" sz="2000" dirty="0"/>
+              <a:t> This option makes </a:t>
+            </a:r>
+            <a:r>
+              <a:rPr lang="en-GB" sz="2000" dirty="0" err="1"/>
+              <a:t>losetup</a:t>
+            </a:r>
+            <a:r>
+              <a:rPr lang="en-GB" sz="2000" dirty="0"/>
+              <a:t> display the name of the loop device it finds.</a:t>
+            </a:r>
+          </a:p>
+          <a:p>
+            <a:pPr marL="342900" indent="-342900">
+              <a:buFont typeface="Arial" panose="020B0604020202020204" pitchFamily="34" charset="0"/>
+              <a:buChar char="•"/>
+            </a:pPr>
+            <a:r>
+              <a:rPr lang="en-GB" sz="2000" b="1" dirty="0"/>
+              <a:t>--read-only:</a:t>
+            </a:r>
+            <a:r>
+              <a:rPr lang="en-GB" sz="2000" dirty="0"/>
+              <a:t> This option sets up the loop device as read-only. </a:t>
+            </a:r>
+          </a:p>
+        </p:txBody>
+      </p:sp>
+    </p:spTree>
+    <p:extLst>
+      <p:ext uri="{BB962C8B-B14F-4D97-AF65-F5344CB8AC3E}">
+        <p14:creationId xmlns:p14="http://schemas.microsoft.com/office/powerpoint/2010/main" val="682761566"/>
+      </p:ext>
+    </p:extLst>
+  </p:cSld>
+  <p:clrMapOvr>
+    <a:masterClrMapping/>
+  </p:clrMapOvr>
+</p:sld>
+</file>
+
+<file path=ppt/slides/slide17.xml><?xml version="1.0" encoding="utf-8"?>
+<p:sld xmlns:a="http://schemas.openxmlformats.org/drawingml/2006/main" xmlns:r="http://schemas.openxmlformats.org/officeDocument/2006/relationships" xmlns:p="http://schemas.openxmlformats.org/presentationml/2006/main">
+  <p:cSld>
+    <p:spTree>
+      <p:nvGrpSpPr>
+        <p:cNvPr id="1" name=""/>
+        <p:cNvGrpSpPr/>
+        <p:nvPr/>
+      </p:nvGrpSpPr>
+      <p:grpSpPr>
+        <a:xfrm>
+          <a:off x="0" y="0"/>
+          <a:ext cx="0" cy="0"/>
+          <a:chOff x="0" y="0"/>
+          <a:chExt cx="0" cy="0"/>
+        </a:xfrm>
+      </p:grpSpPr>
+      <p:sp>
+        <p:nvSpPr>
+          <p:cNvPr id="2" name="Title 1">
+            <a:extLst>
+              <a:ext uri="{FF2B5EF4-FFF2-40B4-BE49-F238E27FC236}">
+                <a16:creationId xmlns:a16="http://schemas.microsoft.com/office/drawing/2014/main" id="{EDC9B5B3-F536-FDF1-55DE-6EC5BE763F7D}"/>
+              </a:ext>
+            </a:extLst>
+          </p:cNvPr>
+          <p:cNvSpPr>
+            <a:spLocks noGrp="1"/>
+          </p:cNvSpPr>
+          <p:nvPr>
+            <p:ph type="title"/>
+          </p:nvPr>
+        </p:nvSpPr>
+        <p:spPr>
+          <a:xfrm>
+            <a:off x="838200" y="365125"/>
+            <a:ext cx="10515600" cy="1325563"/>
+          </a:xfrm>
+        </p:spPr>
+        <p:txBody>
+          <a:bodyPr/>
+          <a:lstStyle/>
+          <a:p>
+            <a:r>
+              <a:rPr lang="en-PK" dirty="0"/>
+              <a:t>Check Partition Numbers of Block Devices</a:t>
+            </a:r>
+          </a:p>
+        </p:txBody>
+      </p:sp>
+      <p:sp>
+        <p:nvSpPr>
+          <p:cNvPr id="5" name="TextBox 4">
+            <a:extLst>
+              <a:ext uri="{FF2B5EF4-FFF2-40B4-BE49-F238E27FC236}">
+                <a16:creationId xmlns:a16="http://schemas.microsoft.com/office/drawing/2014/main" id="{5F2F3BF7-FBCD-A111-ADF5-E9968A145F18}"/>
+              </a:ext>
+            </a:extLst>
+          </p:cNvPr>
+          <p:cNvSpPr txBox="1"/>
+          <p:nvPr/>
+        </p:nvSpPr>
+        <p:spPr>
+          <a:xfrm>
+            <a:off x="838200" y="1690688"/>
+            <a:ext cx="1790700" cy="369332"/>
+          </a:xfrm>
+          <a:prstGeom prst="rect">
+            <a:avLst/>
+          </a:prstGeom>
+          <a:solidFill>
+            <a:schemeClr val="accent4"/>
+          </a:solidFill>
+        </p:spPr>
+        <p:txBody>
+          <a:bodyPr wrap="square">
+            <a:spAutoFit/>
+          </a:bodyPr>
+          <a:lstStyle/>
+          <a:p>
+            <a:r>
+              <a:rPr lang="en-GB" dirty="0"/>
+              <a:t>List block devices</a:t>
+            </a:r>
+            <a:endParaRPr lang="en-US" dirty="0"/>
+          </a:p>
+        </p:txBody>
+      </p:sp>
+      <p:grpSp>
+        <p:nvGrpSpPr>
+          <p:cNvPr id="6" name="Group 5">
+            <a:extLst>
+              <a:ext uri="{FF2B5EF4-FFF2-40B4-BE49-F238E27FC236}">
+                <a16:creationId xmlns:a16="http://schemas.microsoft.com/office/drawing/2014/main" id="{B3DAD561-8BA1-820A-7BEE-B35EA1ED3C29}"/>
+              </a:ext>
+            </a:extLst>
+          </p:cNvPr>
+          <p:cNvGrpSpPr/>
+          <p:nvPr/>
+        </p:nvGrpSpPr>
+        <p:grpSpPr>
+          <a:xfrm>
+            <a:off x="838200" y="2060020"/>
+            <a:ext cx="6781800" cy="4132233"/>
+            <a:chOff x="838200" y="2060020"/>
+            <a:chExt cx="6781800" cy="4132233"/>
+          </a:xfrm>
+        </p:grpSpPr>
+        <p:pic>
+          <p:nvPicPr>
+            <p:cNvPr id="8" name="Picture 7" descr="A screenshot of a computer&#10;&#10;Description automatically generated">
+              <a:extLst>
+                <a:ext uri="{FF2B5EF4-FFF2-40B4-BE49-F238E27FC236}">
+                  <a16:creationId xmlns:a16="http://schemas.microsoft.com/office/drawing/2014/main" id="{9C9E685C-0ED4-8915-805F-AF50ECE746DB}"/>
+                </a:ext>
+              </a:extLst>
+            </p:cNvPr>
+            <p:cNvPicPr>
+              <a:picLocks noChangeAspect="1"/>
+            </p:cNvPicPr>
+            <p:nvPr/>
+          </p:nvPicPr>
+          <p:blipFill rotWithShape="1">
+            <a:blip r:embed="rId3">
+              <a:extLst>
+                <a:ext uri="{28A0092B-C50C-407E-A947-70E740481C1C}">
+                  <a14:useLocalDpi xmlns:a14="http://schemas.microsoft.com/office/drawing/2010/main" val="0"/>
+                </a:ext>
+              </a:extLst>
+            </a:blip>
+            <a:srcRect b="21973"/>
+            <a:stretch/>
+          </p:blipFill>
+          <p:spPr>
+            <a:xfrm>
+              <a:off x="838200" y="2060020"/>
+              <a:ext cx="6781800" cy="4132233"/>
+            </a:xfrm>
+            <a:prstGeom prst="rect">
+              <a:avLst/>
+            </a:prstGeom>
+          </p:spPr>
+        </p:pic>
+        <p:pic>
+          <p:nvPicPr>
+            <p:cNvPr id="4" name="Picture 3">
+              <a:extLst>
+                <a:ext uri="{FF2B5EF4-FFF2-40B4-BE49-F238E27FC236}">
+                  <a16:creationId xmlns:a16="http://schemas.microsoft.com/office/drawing/2014/main" id="{0D84E5EF-3393-7028-9CF8-BF8D29B88BB0}"/>
+                </a:ext>
+              </a:extLst>
+            </p:cNvPr>
+            <p:cNvPicPr>
+              <a:picLocks noChangeAspect="1"/>
+            </p:cNvPicPr>
+            <p:nvPr/>
+          </p:nvPicPr>
+          <p:blipFill>
+            <a:blip r:embed="rId4"/>
+            <a:stretch>
+              <a:fillRect/>
+            </a:stretch>
+          </p:blipFill>
+          <p:spPr>
+            <a:xfrm>
+              <a:off x="2723030" y="2178257"/>
+              <a:ext cx="1371600" cy="254000"/>
+            </a:xfrm>
+            <a:prstGeom prst="rect">
+              <a:avLst/>
+            </a:prstGeom>
+          </p:spPr>
+        </p:pic>
+      </p:grpSp>
+      <p:pic>
+        <p:nvPicPr>
+          <p:cNvPr id="10" name="Picture 9" descr="A screenshot of a computer&#10;&#10;Description automatically generated">
+            <a:extLst>
+              <a:ext uri="{FF2B5EF4-FFF2-40B4-BE49-F238E27FC236}">
+                <a16:creationId xmlns:a16="http://schemas.microsoft.com/office/drawing/2014/main" id="{0F823E1F-B101-8B9B-29FD-639FF5784F82}"/>
+              </a:ext>
+            </a:extLst>
+          </p:cNvPr>
+          <p:cNvPicPr>
+            <a:picLocks noChangeAspect="1"/>
+          </p:cNvPicPr>
+          <p:nvPr/>
+        </p:nvPicPr>
+        <p:blipFill rotWithShape="1">
+          <a:blip r:embed="rId3">
+            <a:extLst>
+              <a:ext uri="{28A0092B-C50C-407E-A947-70E740481C1C}">
+                <a14:useLocalDpi xmlns:a14="http://schemas.microsoft.com/office/drawing/2010/main" val="0"/>
+              </a:ext>
+            </a:extLst>
+          </a:blip>
+          <a:srcRect t="78122" r="-9551"/>
+          <a:stretch/>
+        </p:blipFill>
+        <p:spPr>
+          <a:xfrm>
+            <a:off x="4746457" y="3561346"/>
+            <a:ext cx="7429499" cy="1158655"/>
+          </a:xfrm>
+          <a:prstGeom prst="rect">
+            <a:avLst/>
+          </a:prstGeom>
+        </p:spPr>
+      </p:pic>
+      <p:grpSp>
+        <p:nvGrpSpPr>
+          <p:cNvPr id="9" name="Group 8">
+            <a:extLst>
+              <a:ext uri="{FF2B5EF4-FFF2-40B4-BE49-F238E27FC236}">
+                <a16:creationId xmlns:a16="http://schemas.microsoft.com/office/drawing/2014/main" id="{1DD476A4-3B98-9475-A0F2-0670B45078F5}"/>
+              </a:ext>
+            </a:extLst>
+          </p:cNvPr>
+          <p:cNvGrpSpPr/>
+          <p:nvPr/>
+        </p:nvGrpSpPr>
+        <p:grpSpPr>
+          <a:xfrm>
+            <a:off x="4762500" y="4592053"/>
+            <a:ext cx="7429500" cy="1600200"/>
+            <a:chOff x="4762500" y="4592053"/>
+            <a:chExt cx="7429500" cy="1600200"/>
+          </a:xfrm>
+        </p:grpSpPr>
+        <p:pic>
+          <p:nvPicPr>
+            <p:cNvPr id="12" name="Picture 11" descr="A screen shot of a computer&#10;&#10;Description automatically generated">
+              <a:extLst>
+                <a:ext uri="{FF2B5EF4-FFF2-40B4-BE49-F238E27FC236}">
+                  <a16:creationId xmlns:a16="http://schemas.microsoft.com/office/drawing/2014/main" id="{CE069D3C-6C94-8807-4910-85C0B2FFDD50}"/>
+                </a:ext>
+              </a:extLst>
+            </p:cNvPr>
+            <p:cNvPicPr>
+              <a:picLocks noChangeAspect="1"/>
+            </p:cNvPicPr>
+            <p:nvPr/>
+          </p:nvPicPr>
+          <p:blipFill>
+            <a:blip r:embed="rId5">
+              <a:extLst>
+                <a:ext uri="{28A0092B-C50C-407E-A947-70E740481C1C}">
+                  <a14:useLocalDpi xmlns:a14="http://schemas.microsoft.com/office/drawing/2010/main" val="0"/>
+                </a:ext>
+              </a:extLst>
+            </a:blip>
+            <a:stretch>
+              <a:fillRect/>
+            </a:stretch>
+          </p:blipFill>
+          <p:spPr>
+            <a:xfrm>
+              <a:off x="4762500" y="4592053"/>
+              <a:ext cx="7429500" cy="1600200"/>
+            </a:xfrm>
+            <a:prstGeom prst="rect">
+              <a:avLst/>
+            </a:prstGeom>
+          </p:spPr>
+        </p:pic>
+        <p:pic>
+          <p:nvPicPr>
+            <p:cNvPr id="7" name="Picture 6">
+              <a:extLst>
+                <a:ext uri="{FF2B5EF4-FFF2-40B4-BE49-F238E27FC236}">
+                  <a16:creationId xmlns:a16="http://schemas.microsoft.com/office/drawing/2014/main" id="{C07A4F4C-4C58-EA22-34B9-314ACE3A55DB}"/>
+                </a:ext>
+              </a:extLst>
+            </p:cNvPr>
+            <p:cNvPicPr>
+              <a:picLocks noChangeAspect="1"/>
+            </p:cNvPicPr>
+            <p:nvPr/>
+          </p:nvPicPr>
+          <p:blipFill>
+            <a:blip r:embed="rId4"/>
+            <a:stretch>
+              <a:fillRect/>
+            </a:stretch>
+          </p:blipFill>
+          <p:spPr>
+            <a:xfrm>
+              <a:off x="6593541" y="5623708"/>
+              <a:ext cx="1371600" cy="254000"/>
+            </a:xfrm>
+            <a:prstGeom prst="rect">
+              <a:avLst/>
+            </a:prstGeom>
+          </p:spPr>
+        </p:pic>
+      </p:grpSp>
+    </p:spTree>
+    <p:extLst>
+      <p:ext uri="{BB962C8B-B14F-4D97-AF65-F5344CB8AC3E}">
+        <p14:creationId xmlns:p14="http://schemas.microsoft.com/office/powerpoint/2010/main" val="3839354834"/>
+      </p:ext>
+    </p:extLst>
+  </p:cSld>
+  <p:clrMapOvr>
+    <a:masterClrMapping/>
+  </p:clrMapOvr>
+</p:sld>
+</file>
+
+<file path=ppt/slides/slide18.xml><?xml version="1.0" encoding="utf-8"?>
+<p:sld xmlns:a="http://schemas.openxmlformats.org/drawingml/2006/main" xmlns:r="http://schemas.openxmlformats.org/officeDocument/2006/relationships" xmlns:p="http://schemas.openxmlformats.org/presentationml/2006/main">
+  <p:cSld>
+    <p:spTree>
+      <p:nvGrpSpPr>
+        <p:cNvPr id="1" name=""/>
+        <p:cNvGrpSpPr/>
+        <p:nvPr/>
+      </p:nvGrpSpPr>
+      <p:grpSpPr>
+        <a:xfrm>
+          <a:off x="0" y="0"/>
+          <a:ext cx="0" cy="0"/>
+          <a:chOff x="0" y="0"/>
+          <a:chExt cx="0" cy="0"/>
+        </a:xfrm>
+      </p:grpSpPr>
+      <p:sp>
+        <p:nvSpPr>
+          <p:cNvPr id="2" name="Title 1">
+            <a:extLst>
+              <a:ext uri="{FF2B5EF4-FFF2-40B4-BE49-F238E27FC236}">
+                <a16:creationId xmlns:a16="http://schemas.microsoft.com/office/drawing/2014/main" id="{EDC9B5B3-F536-FDF1-55DE-6EC5BE763F7D}"/>
+              </a:ext>
+            </a:extLst>
+          </p:cNvPr>
+          <p:cNvSpPr>
+            <a:spLocks noGrp="1"/>
+          </p:cNvSpPr>
+          <p:nvPr>
+            <p:ph type="title"/>
+          </p:nvPr>
+        </p:nvSpPr>
+        <p:spPr/>
+        <p:txBody>
+          <a:bodyPr/>
+          <a:lstStyle/>
+          <a:p>
             <a:r>
               <a:rPr lang="en-PK" dirty="0"/>
               <a:t>Check Partitions Layout of Image</a:t>
@@ -4708,7 +5614,7 @@
 </p:sld>
 </file>
 
-<file path=ppt/slides/slide16.xml><?xml version="1.0" encoding="utf-8"?>
+<file path=ppt/slides/slide19.xml><?xml version="1.0" encoding="utf-8"?>
 <p:sld xmlns:a="http://schemas.openxmlformats.org/drawingml/2006/main" xmlns:r="http://schemas.openxmlformats.org/officeDocument/2006/relationships" xmlns:p="http://schemas.openxmlformats.org/presentationml/2006/main">
   <p:cSld>
     <p:spTree>
@@ -4746,7 +5652,6 @@
           <a:bodyPr/>
           <a:lstStyle/>
           <a:p>
-            <a:pPr algn="ctr"/>
             <a:r>
               <a:rPr lang="en-PK" dirty="0"/>
               <a:t>Mount System Partition (p21)</a:t>
@@ -4794,10 +5699,10 @@
       </p:sp>
       <p:pic>
         <p:nvPicPr>
-          <p:cNvPr id="3" name="Picture 2" descr="A screen shot of a computer&#10;&#10;Description automatically generated">
+          <p:cNvPr id="5" name="Picture 4" descr="A screenshot of a computer&#10;&#10;Description automatically generated">
             <a:extLst>
               <a:ext uri="{FF2B5EF4-FFF2-40B4-BE49-F238E27FC236}">
-                <a16:creationId xmlns:a16="http://schemas.microsoft.com/office/drawing/2014/main" id="{C50AF118-C3A8-77EB-DAEA-DBE5F8499531}"/>
+                <a16:creationId xmlns:a16="http://schemas.microsoft.com/office/drawing/2014/main" id="{0B98422D-F595-24D8-C8A8-D6F554F7B6D8}"/>
               </a:ext>
             </a:extLst>
           </p:cNvPr>
@@ -4820,8 +5725,8 @@
         </p:blipFill>
         <p:spPr>
           <a:xfrm>
-            <a:off x="838198" y="2060020"/>
-            <a:ext cx="10465200" cy="3420489"/>
+            <a:off x="838200" y="2060020"/>
+            <a:ext cx="10440000" cy="2963545"/>
           </a:xfrm>
           <a:prstGeom prst="rect">
             <a:avLst/>
@@ -4832,139 +5737,6 @@
     <p:extLst>
       <p:ext uri="{BB962C8B-B14F-4D97-AF65-F5344CB8AC3E}">
         <p14:creationId xmlns:p14="http://schemas.microsoft.com/office/powerpoint/2010/main" val="946570067"/>
-      </p:ext>
-    </p:extLst>
-  </p:cSld>
-  <p:clrMapOvr>
-    <a:masterClrMapping/>
-  </p:clrMapOvr>
-</p:sld>
-</file>
-
-<file path=ppt/slides/slide17.xml><?xml version="1.0" encoding="utf-8"?>
-<p:sld xmlns:a="http://schemas.openxmlformats.org/drawingml/2006/main" xmlns:r="http://schemas.openxmlformats.org/officeDocument/2006/relationships" xmlns:p="http://schemas.openxmlformats.org/presentationml/2006/main">
-  <p:cSld>
-    <p:spTree>
-      <p:nvGrpSpPr>
-        <p:cNvPr id="1" name=""/>
-        <p:cNvGrpSpPr/>
-        <p:nvPr/>
-      </p:nvGrpSpPr>
-      <p:grpSpPr>
-        <a:xfrm>
-          <a:off x="0" y="0"/>
-          <a:ext cx="0" cy="0"/>
-          <a:chOff x="0" y="0"/>
-          <a:chExt cx="0" cy="0"/>
-        </a:xfrm>
-      </p:grpSpPr>
-      <p:sp>
-        <p:nvSpPr>
-          <p:cNvPr id="2" name="Title 1">
-            <a:extLst>
-              <a:ext uri="{FF2B5EF4-FFF2-40B4-BE49-F238E27FC236}">
-                <a16:creationId xmlns:a16="http://schemas.microsoft.com/office/drawing/2014/main" id="{EDC9B5B3-F536-FDF1-55DE-6EC5BE763F7D}"/>
-              </a:ext>
-            </a:extLst>
-          </p:cNvPr>
-          <p:cNvSpPr>
-            <a:spLocks noGrp="1"/>
-          </p:cNvSpPr>
-          <p:nvPr>
-            <p:ph type="title"/>
-          </p:nvPr>
-        </p:nvSpPr>
-        <p:spPr/>
-        <p:txBody>
-          <a:bodyPr/>
-          <a:lstStyle/>
-          <a:p>
-            <a:pPr algn="ctr"/>
-            <a:r>
-              <a:rPr lang="en-PK" dirty="0"/>
-              <a:t>Mount Userdata Partition (p23)</a:t>
-            </a:r>
-          </a:p>
-        </p:txBody>
-      </p:sp>
-      <p:sp>
-        <p:nvSpPr>
-          <p:cNvPr id="5" name="TextBox 4">
-            <a:extLst>
-              <a:ext uri="{FF2B5EF4-FFF2-40B4-BE49-F238E27FC236}">
-                <a16:creationId xmlns:a16="http://schemas.microsoft.com/office/drawing/2014/main" id="{5F2F3BF7-FBCD-A111-ADF5-E9968A145F18}"/>
-              </a:ext>
-            </a:extLst>
-          </p:cNvPr>
-          <p:cNvSpPr txBox="1"/>
-          <p:nvPr/>
-        </p:nvSpPr>
-        <p:spPr>
-          <a:xfrm>
-            <a:off x="838201" y="1690688"/>
-            <a:ext cx="3860800" cy="369332"/>
-          </a:xfrm>
-          <a:prstGeom prst="rect">
-            <a:avLst/>
-          </a:prstGeom>
-          <a:solidFill>
-            <a:schemeClr val="accent4"/>
-          </a:solidFill>
-        </p:spPr>
-        <p:txBody>
-          <a:bodyPr wrap="square">
-            <a:spAutoFit/>
-          </a:bodyPr>
-          <a:lstStyle/>
-          <a:p>
-            <a:r>
-              <a:rPr lang="en-GB" dirty="0"/>
-              <a:t>Mount loop device, go to mount point</a:t>
-            </a:r>
-            <a:endParaRPr lang="en-US" dirty="0"/>
-          </a:p>
-        </p:txBody>
-      </p:sp>
-      <p:pic>
-        <p:nvPicPr>
-          <p:cNvPr id="8" name="Picture 7" descr="A screenshot of a computer program&#10;&#10;Description automatically generated">
-            <a:extLst>
-              <a:ext uri="{FF2B5EF4-FFF2-40B4-BE49-F238E27FC236}">
-                <a16:creationId xmlns:a16="http://schemas.microsoft.com/office/drawing/2014/main" id="{07FA4D69-26A9-1786-6CB6-0BFB1541562A}"/>
-              </a:ext>
-            </a:extLst>
-          </p:cNvPr>
-          <p:cNvPicPr>
-            <a:picLocks noChangeAspect="1"/>
-          </p:cNvPicPr>
-          <p:nvPr/>
-        </p:nvPicPr>
-        <p:blipFill>
-          <a:blip r:embed="rId2">
-            <a:extLst>
-              <a:ext uri="{28A0092B-C50C-407E-A947-70E740481C1C}">
-                <a14:useLocalDpi xmlns:a14="http://schemas.microsoft.com/office/drawing/2010/main" val="0"/>
-              </a:ext>
-            </a:extLst>
-          </a:blip>
-          <a:stretch>
-            <a:fillRect/>
-          </a:stretch>
-        </p:blipFill>
-        <p:spPr>
-          <a:xfrm>
-            <a:off x="838200" y="2060020"/>
-            <a:ext cx="10540800" cy="3959953"/>
-          </a:xfrm>
-          <a:prstGeom prst="rect">
-            <a:avLst/>
-          </a:prstGeom>
-        </p:spPr>
-      </p:pic>
-    </p:spTree>
-    <p:extLst>
-      <p:ext uri="{BB962C8B-B14F-4D97-AF65-F5344CB8AC3E}">
-        <p14:creationId xmlns:p14="http://schemas.microsoft.com/office/powerpoint/2010/main" val="27491745"/>
       </p:ext>
     </p:extLst>
   </p:cSld>
@@ -5057,6 +5829,350 @@
 </p:sld>
 </file>
 
+<file path=ppt/slides/slide20.xml><?xml version="1.0" encoding="utf-8"?>
+<p:sld xmlns:a="http://schemas.openxmlformats.org/drawingml/2006/main" xmlns:r="http://schemas.openxmlformats.org/officeDocument/2006/relationships" xmlns:p="http://schemas.openxmlformats.org/presentationml/2006/main">
+  <p:cSld>
+    <p:spTree>
+      <p:nvGrpSpPr>
+        <p:cNvPr id="1" name=""/>
+        <p:cNvGrpSpPr/>
+        <p:nvPr/>
+      </p:nvGrpSpPr>
+      <p:grpSpPr>
+        <a:xfrm>
+          <a:off x="0" y="0"/>
+          <a:ext cx="0" cy="0"/>
+          <a:chOff x="0" y="0"/>
+          <a:chExt cx="0" cy="0"/>
+        </a:xfrm>
+      </p:grpSpPr>
+      <p:sp>
+        <p:nvSpPr>
+          <p:cNvPr id="2" name="Title 1">
+            <a:extLst>
+              <a:ext uri="{FF2B5EF4-FFF2-40B4-BE49-F238E27FC236}">
+                <a16:creationId xmlns:a16="http://schemas.microsoft.com/office/drawing/2014/main" id="{EDC9B5B3-F536-FDF1-55DE-6EC5BE763F7D}"/>
+              </a:ext>
+            </a:extLst>
+          </p:cNvPr>
+          <p:cNvSpPr>
+            <a:spLocks noGrp="1"/>
+          </p:cNvSpPr>
+          <p:nvPr>
+            <p:ph type="title"/>
+          </p:nvPr>
+        </p:nvSpPr>
+        <p:spPr/>
+        <p:txBody>
+          <a:bodyPr/>
+          <a:lstStyle/>
+          <a:p>
+            <a:r>
+              <a:rPr lang="en-PK" dirty="0"/>
+              <a:t>Mount Userdata Partition (p23)</a:t>
+            </a:r>
+          </a:p>
+        </p:txBody>
+      </p:sp>
+      <p:sp>
+        <p:nvSpPr>
+          <p:cNvPr id="5" name="TextBox 4">
+            <a:extLst>
+              <a:ext uri="{FF2B5EF4-FFF2-40B4-BE49-F238E27FC236}">
+                <a16:creationId xmlns:a16="http://schemas.microsoft.com/office/drawing/2014/main" id="{5F2F3BF7-FBCD-A111-ADF5-E9968A145F18}"/>
+              </a:ext>
+            </a:extLst>
+          </p:cNvPr>
+          <p:cNvSpPr txBox="1"/>
+          <p:nvPr/>
+        </p:nvSpPr>
+        <p:spPr>
+          <a:xfrm>
+            <a:off x="838201" y="1690688"/>
+            <a:ext cx="3860800" cy="369332"/>
+          </a:xfrm>
+          <a:prstGeom prst="rect">
+            <a:avLst/>
+          </a:prstGeom>
+          <a:solidFill>
+            <a:schemeClr val="accent4"/>
+          </a:solidFill>
+        </p:spPr>
+        <p:txBody>
+          <a:bodyPr wrap="square">
+            <a:spAutoFit/>
+          </a:bodyPr>
+          <a:lstStyle/>
+          <a:p>
+            <a:r>
+              <a:rPr lang="en-GB" dirty="0"/>
+              <a:t>Mount loop device, go to mount point</a:t>
+            </a:r>
+            <a:endParaRPr lang="en-US" dirty="0"/>
+          </a:p>
+        </p:txBody>
+      </p:sp>
+      <p:pic>
+        <p:nvPicPr>
+          <p:cNvPr id="4" name="Picture 3" descr="A screenshot of a computer&#10;&#10;Description automatically generated">
+            <a:extLst>
+              <a:ext uri="{FF2B5EF4-FFF2-40B4-BE49-F238E27FC236}">
+                <a16:creationId xmlns:a16="http://schemas.microsoft.com/office/drawing/2014/main" id="{2217FC4A-76E0-D76E-7268-870D2370922C}"/>
+              </a:ext>
+            </a:extLst>
+          </p:cNvPr>
+          <p:cNvPicPr>
+            <a:picLocks noChangeAspect="1"/>
+          </p:cNvPicPr>
+          <p:nvPr/>
+        </p:nvPicPr>
+        <p:blipFill>
+          <a:blip r:embed="rId2">
+            <a:extLst>
+              <a:ext uri="{28A0092B-C50C-407E-A947-70E740481C1C}">
+                <a14:useLocalDpi xmlns:a14="http://schemas.microsoft.com/office/drawing/2010/main" val="0"/>
+              </a:ext>
+            </a:extLst>
+          </a:blip>
+          <a:stretch>
+            <a:fillRect/>
+          </a:stretch>
+        </p:blipFill>
+        <p:spPr>
+          <a:xfrm>
+            <a:off x="838200" y="2060019"/>
+            <a:ext cx="10440000" cy="2154496"/>
+          </a:xfrm>
+          <a:prstGeom prst="rect">
+            <a:avLst/>
+          </a:prstGeom>
+        </p:spPr>
+      </p:pic>
+      <p:sp>
+        <p:nvSpPr>
+          <p:cNvPr id="6" name="TextBox 5">
+            <a:extLst>
+              <a:ext uri="{FF2B5EF4-FFF2-40B4-BE49-F238E27FC236}">
+                <a16:creationId xmlns:a16="http://schemas.microsoft.com/office/drawing/2014/main" id="{9FD20008-B52E-574A-48C9-EC255D8F4398}"/>
+              </a:ext>
+            </a:extLst>
+          </p:cNvPr>
+          <p:cNvSpPr txBox="1"/>
+          <p:nvPr/>
+        </p:nvSpPr>
+        <p:spPr>
+          <a:xfrm>
+            <a:off x="838200" y="4359915"/>
+            <a:ext cx="10515599" cy="1938992"/>
+          </a:xfrm>
+          <a:prstGeom prst="rect">
+            <a:avLst/>
+          </a:prstGeom>
+          <a:solidFill>
+            <a:schemeClr val="accent4">
+              <a:lumMod val="20000"/>
+              <a:lumOff val="80000"/>
+            </a:schemeClr>
+          </a:solidFill>
+        </p:spPr>
+        <p:txBody>
+          <a:bodyPr wrap="square" rtlCol="0">
+            <a:spAutoFit/>
+          </a:bodyPr>
+          <a:lstStyle/>
+          <a:p>
+            <a:pPr marL="342900" indent="-342900">
+              <a:buFont typeface="Arial" panose="020B0604020202020204" pitchFamily="34" charset="0"/>
+              <a:buChar char="•"/>
+            </a:pPr>
+            <a:r>
+              <a:rPr lang="en-GB" sz="2000" dirty="0"/>
+              <a:t>The </a:t>
+            </a:r>
+            <a:r>
+              <a:rPr lang="en-GB" sz="2000" b="1" i="1" dirty="0" err="1"/>
+              <a:t>noload</a:t>
+            </a:r>
+            <a:r>
+              <a:rPr lang="en-GB" sz="2000" dirty="0"/>
+              <a:t> option refers to a mount option that prevents the kernel from loading the journal of the file system. </a:t>
+            </a:r>
+          </a:p>
+          <a:p>
+            <a:pPr marL="342900" indent="-342900">
+              <a:buFont typeface="Arial" panose="020B0604020202020204" pitchFamily="34" charset="0"/>
+              <a:buChar char="•"/>
+            </a:pPr>
+            <a:r>
+              <a:rPr lang="en-GB" sz="2000" dirty="0"/>
+              <a:t>The journal (in file systems such as ext3 and ext4) keeps track of changes to the file system for faster recovery in case of a system crash or unexpected shutdown.</a:t>
+            </a:r>
+          </a:p>
+          <a:p>
+            <a:pPr marL="342900" indent="-342900">
+              <a:buFont typeface="Arial" panose="020B0604020202020204" pitchFamily="34" charset="0"/>
+              <a:buChar char="•"/>
+            </a:pPr>
+            <a:r>
+              <a:rPr lang="en-GB" sz="2000" dirty="0"/>
+              <a:t>Using </a:t>
+            </a:r>
+            <a:r>
+              <a:rPr lang="en-GB" sz="2000" b="1" i="1" dirty="0" err="1"/>
+              <a:t>noload</a:t>
+            </a:r>
+            <a:r>
+              <a:rPr lang="en-GB" sz="2000" dirty="0"/>
+              <a:t> is necessary when dealing with forensic analysis where you want to examine the file system without making any modifications. </a:t>
+            </a:r>
+          </a:p>
+        </p:txBody>
+      </p:sp>
+    </p:spTree>
+    <p:extLst>
+      <p:ext uri="{BB962C8B-B14F-4D97-AF65-F5344CB8AC3E}">
+        <p14:creationId xmlns:p14="http://schemas.microsoft.com/office/powerpoint/2010/main" val="27491745"/>
+      </p:ext>
+    </p:extLst>
+  </p:cSld>
+  <p:clrMapOvr>
+    <a:masterClrMapping/>
+  </p:clrMapOvr>
+</p:sld>
+</file>
+
+<file path=ppt/slides/slide21.xml><?xml version="1.0" encoding="utf-8"?>
+<p:sld xmlns:a="http://schemas.openxmlformats.org/drawingml/2006/main" xmlns:r="http://schemas.openxmlformats.org/officeDocument/2006/relationships" xmlns:p="http://schemas.openxmlformats.org/presentationml/2006/main">
+  <p:cSld>
+    <p:spTree>
+      <p:nvGrpSpPr>
+        <p:cNvPr id="1" name=""/>
+        <p:cNvGrpSpPr/>
+        <p:nvPr/>
+      </p:nvGrpSpPr>
+      <p:grpSpPr>
+        <a:xfrm>
+          <a:off x="0" y="0"/>
+          <a:ext cx="0" cy="0"/>
+          <a:chOff x="0" y="0"/>
+          <a:chExt cx="0" cy="0"/>
+        </a:xfrm>
+      </p:grpSpPr>
+      <p:sp>
+        <p:nvSpPr>
+          <p:cNvPr id="2" name="Title 1">
+            <a:extLst>
+              <a:ext uri="{FF2B5EF4-FFF2-40B4-BE49-F238E27FC236}">
+                <a16:creationId xmlns:a16="http://schemas.microsoft.com/office/drawing/2014/main" id="{EDC9B5B3-F536-FDF1-55DE-6EC5BE763F7D}"/>
+              </a:ext>
+            </a:extLst>
+          </p:cNvPr>
+          <p:cNvSpPr>
+            <a:spLocks noGrp="1"/>
+          </p:cNvSpPr>
+          <p:nvPr>
+            <p:ph type="title"/>
+          </p:nvPr>
+        </p:nvSpPr>
+        <p:spPr/>
+        <p:txBody>
+          <a:bodyPr/>
+          <a:lstStyle/>
+          <a:p>
+            <a:r>
+              <a:rPr lang="en-PK" dirty="0"/>
+              <a:t>Mount Userdata Partition (p23)</a:t>
+            </a:r>
+          </a:p>
+        </p:txBody>
+      </p:sp>
+      <p:sp>
+        <p:nvSpPr>
+          <p:cNvPr id="5" name="TextBox 4">
+            <a:extLst>
+              <a:ext uri="{FF2B5EF4-FFF2-40B4-BE49-F238E27FC236}">
+                <a16:creationId xmlns:a16="http://schemas.microsoft.com/office/drawing/2014/main" id="{5F2F3BF7-FBCD-A111-ADF5-E9968A145F18}"/>
+              </a:ext>
+            </a:extLst>
+          </p:cNvPr>
+          <p:cNvSpPr txBox="1"/>
+          <p:nvPr/>
+        </p:nvSpPr>
+        <p:spPr>
+          <a:xfrm>
+            <a:off x="838201" y="1690688"/>
+            <a:ext cx="3860800" cy="369332"/>
+          </a:xfrm>
+          <a:prstGeom prst="rect">
+            <a:avLst/>
+          </a:prstGeom>
+          <a:solidFill>
+            <a:schemeClr val="accent4"/>
+          </a:solidFill>
+        </p:spPr>
+        <p:txBody>
+          <a:bodyPr wrap="square">
+            <a:spAutoFit/>
+          </a:bodyPr>
+          <a:lstStyle/>
+          <a:p>
+            <a:r>
+              <a:rPr lang="en-GB" dirty="0"/>
+              <a:t>Mount loop device, go to mount point</a:t>
+            </a:r>
+            <a:endParaRPr lang="en-US" dirty="0"/>
+          </a:p>
+        </p:txBody>
+      </p:sp>
+      <p:pic>
+        <p:nvPicPr>
+          <p:cNvPr id="6" name="Picture 5" descr="A screen shot of a computer&#10;&#10;Description automatically generated">
+            <a:extLst>
+              <a:ext uri="{FF2B5EF4-FFF2-40B4-BE49-F238E27FC236}">
+                <a16:creationId xmlns:a16="http://schemas.microsoft.com/office/drawing/2014/main" id="{5775BA21-BFDB-1F7D-1081-33B2B51C732C}"/>
+              </a:ext>
+            </a:extLst>
+          </p:cNvPr>
+          <p:cNvPicPr>
+            <a:picLocks noChangeAspect="1"/>
+          </p:cNvPicPr>
+          <p:nvPr/>
+        </p:nvPicPr>
+        <p:blipFill>
+          <a:blip r:embed="rId2">
+            <a:extLst>
+              <a:ext uri="{28A0092B-C50C-407E-A947-70E740481C1C}">
+                <a14:useLocalDpi xmlns:a14="http://schemas.microsoft.com/office/drawing/2010/main" val="0"/>
+              </a:ext>
+            </a:extLst>
+          </a:blip>
+          <a:stretch>
+            <a:fillRect/>
+          </a:stretch>
+        </p:blipFill>
+        <p:spPr>
+          <a:xfrm>
+            <a:off x="838200" y="2060020"/>
+            <a:ext cx="10954800" cy="1979913"/>
+          </a:xfrm>
+          <a:prstGeom prst="rect">
+            <a:avLst/>
+          </a:prstGeom>
+        </p:spPr>
+      </p:pic>
+    </p:spTree>
+    <p:extLst>
+      <p:ext uri="{BB962C8B-B14F-4D97-AF65-F5344CB8AC3E}">
+        <p14:creationId xmlns:p14="http://schemas.microsoft.com/office/powerpoint/2010/main" val="272412195"/>
+      </p:ext>
+    </p:extLst>
+  </p:cSld>
+  <p:clrMapOvr>
+    <a:masterClrMapping/>
+  </p:clrMapOvr>
+</p:sld>
+</file>
+
 <file path=ppt/slides/slide3.xml><?xml version="1.0" encoding="utf-8"?>
 <p:sld xmlns:a="http://schemas.openxmlformats.org/drawingml/2006/main" xmlns:r="http://schemas.openxmlformats.org/officeDocument/2006/relationships" xmlns:p="http://schemas.openxmlformats.org/presentationml/2006/main">
   <p:cSld>
@@ -5095,7 +6211,6 @@
           <a:bodyPr/>
           <a:lstStyle/>
           <a:p>
-            <a:pPr algn="ctr"/>
             <a:r>
               <a:rPr lang="en-PK" dirty="0"/>
               <a:t>Image Acquisition Steps</a:t>
@@ -5155,7 +6270,7 @@
           <a:p>
             <a:r>
               <a:rPr lang="en-PK" dirty="0"/>
-              <a:t>Open Easy JTAG Tool</a:t>
+              <a:t>Open Easy JTAG Tool on computer</a:t>
             </a:r>
           </a:p>
           <a:p>
@@ -5546,7 +6661,6 @@
           <a:bodyPr/>
           <a:lstStyle/>
           <a:p>
-            <a:pPr algn="ctr"/>
             <a:r>
               <a:rPr lang="en-PK" dirty="0"/>
               <a:t>eMMC Needs Cleaning</a:t>
@@ -5815,7 +6929,6 @@
           <a:bodyPr/>
           <a:lstStyle/>
           <a:p>
-            <a:pPr algn="ctr"/>
             <a:r>
               <a:rPr lang="en-PK" dirty="0"/>
               <a:t>Image Acquisition After Cleaning</a:t>
@@ -5897,6 +7010,53 @@
           </a:prstGeom>
         </p:spPr>
       </p:pic>
+      <p:sp>
+        <p:nvSpPr>
+          <p:cNvPr id="3" name="TextBox 2">
+            <a:extLst>
+              <a:ext uri="{FF2B5EF4-FFF2-40B4-BE49-F238E27FC236}">
+                <a16:creationId xmlns:a16="http://schemas.microsoft.com/office/drawing/2014/main" id="{26F7F65A-B8A1-3D31-5FCE-A31DFD525B38}"/>
+              </a:ext>
+            </a:extLst>
+          </p:cNvPr>
+          <p:cNvSpPr txBox="1"/>
+          <p:nvPr/>
+        </p:nvSpPr>
+        <p:spPr>
+          <a:xfrm>
+            <a:off x="9399494" y="2060020"/>
+            <a:ext cx="1954305" cy="3046988"/>
+          </a:xfrm>
+          <a:prstGeom prst="rect">
+            <a:avLst/>
+          </a:prstGeom>
+          <a:solidFill>
+            <a:schemeClr val="accent4">
+              <a:lumMod val="20000"/>
+              <a:lumOff val="80000"/>
+            </a:schemeClr>
+          </a:solidFill>
+        </p:spPr>
+        <p:txBody>
+          <a:bodyPr wrap="square" rtlCol="0">
+            <a:spAutoFit/>
+          </a:bodyPr>
+          <a:lstStyle/>
+          <a:p>
+            <a:r>
+              <a:rPr lang="en-GB" sz="2400" dirty="0"/>
+              <a:t>Follow the steps to acquire a disk image of eMMC of the Echo Show device</a:t>
+            </a:r>
+          </a:p>
+          <a:p>
+            <a:pPr marL="285750" indent="-285750">
+              <a:buFont typeface="Arial" panose="020B0604020202020204" pitchFamily="34" charset="0"/>
+              <a:buChar char="•"/>
+            </a:pPr>
+            <a:endParaRPr lang="en-GB" sz="2400" dirty="0"/>
+          </a:p>
+        </p:txBody>
+      </p:sp>
     </p:spTree>
     <p:extLst>
       <p:ext uri="{BB962C8B-B14F-4D97-AF65-F5344CB8AC3E}">
@@ -6031,10 +7191,9 @@
           <a:bodyPr/>
           <a:lstStyle/>
           <a:p>
-            <a:pPr algn="ctr"/>
             <a:r>
               <a:rPr lang="en-PK" dirty="0"/>
-              <a:t>Download Image from Link</a:t>
+              <a:t>Download Image from Link (Archived/Zipped)</a:t>
             </a:r>
           </a:p>
         </p:txBody>
@@ -6055,17 +7214,64 @@
             <p:ph idx="1"/>
           </p:nvPr>
         </p:nvSpPr>
-        <p:spPr/>
-        <p:txBody>
-          <a:bodyPr/>
-          <a:lstStyle/>
-          <a:p>
-            <a:r>
-              <a:rPr lang="en-GB" dirty="0">
+        <p:spPr>
+          <a:xfrm>
+            <a:off x="838200" y="1825625"/>
+            <a:ext cx="10515600" cy="4077634"/>
+          </a:xfrm>
+        </p:spPr>
+        <p:txBody>
+          <a:bodyPr>
+            <a:normAutofit/>
+          </a:bodyPr>
+          <a:lstStyle/>
+          <a:p>
+            <a:r>
+              <a:rPr lang="en-PK" dirty="0"/>
+              <a:t>The acquired image has been uploaded to the cloud</a:t>
+            </a:r>
+            <a:endParaRPr lang="en-GB" sz="2800" dirty="0">
+              <a:hlinkClick r:id="rId2"/>
+            </a:endParaRPr>
+          </a:p>
+          <a:p>
+            <a:endParaRPr lang="en-PK" dirty="0"/>
+          </a:p>
+          <a:p>
+            <a:r>
+              <a:rPr lang="en-PK" dirty="0"/>
+              <a:t>The image can be downloaded from </a:t>
+            </a:r>
+            <a:r>
+              <a:rPr lang="en-GB" dirty="0"/>
+              <a:t>the </a:t>
+            </a:r>
+            <a:r>
+              <a:rPr lang="en-PK" dirty="0"/>
+              <a:t>following link:</a:t>
+            </a:r>
+          </a:p>
+          <a:p>
+            <a:endParaRPr lang="en-GB" sz="2800" dirty="0">
+              <a:hlinkClick r:id="rId2"/>
+            </a:endParaRPr>
+          </a:p>
+          <a:p>
+            <a:pPr marL="0" indent="0" algn="ctr">
+              <a:buNone/>
+            </a:pPr>
+            <a:r>
+              <a:rPr lang="en-GB" sz="2800" dirty="0">
                 <a:hlinkClick r:id="rId2"/>
               </a:rPr>
-              <a:t>miya.teracloud.jp/share/11d151b81341ff61</a:t>
-            </a:r>
+              <a:t>https://miya.teracloud.jp/share/11d194c7357b5632</a:t>
+            </a:r>
+            <a:endParaRPr lang="en-GB" sz="2800" dirty="0"/>
+          </a:p>
+          <a:p>
+            <a:endParaRPr lang="en-GB" sz="2800" dirty="0"/>
+          </a:p>
+          <a:p>
             <a:endParaRPr lang="en-PK" dirty="0"/>
           </a:p>
         </p:txBody>
@@ -6073,7 +7279,7 @@
     </p:spTree>
     <p:extLst>
       <p:ext uri="{BB962C8B-B14F-4D97-AF65-F5344CB8AC3E}">
-        <p14:creationId xmlns:p14="http://schemas.microsoft.com/office/powerpoint/2010/main" val="802487842"/>
+        <p14:creationId xmlns:p14="http://schemas.microsoft.com/office/powerpoint/2010/main" val="196530033"/>
       </p:ext>
     </p:extLst>
   </p:cSld>
@@ -6105,7 +7311,7 @@
           <p:cNvPr id="4" name="Title 3">
             <a:extLst>
               <a:ext uri="{FF2B5EF4-FFF2-40B4-BE49-F238E27FC236}">
-                <a16:creationId xmlns:a16="http://schemas.microsoft.com/office/drawing/2014/main" id="{49C2FCA1-650A-42EA-95A7-7A2FFD015D28}"/>
+                <a16:creationId xmlns:a16="http://schemas.microsoft.com/office/drawing/2014/main" id="{97F97EC8-5910-050B-0150-9A71CE99188F}"/>
               </a:ext>
             </a:extLst>
           </p:cNvPr>
@@ -6122,41 +7328,217 @@
           <a:lstStyle/>
           <a:p>
             <a:r>
-              <a:rPr lang="en-US" dirty="0"/>
-              <a:t>Image Verification</a:t>
-            </a:r>
-          </a:p>
-        </p:txBody>
-      </p:sp>
-      <p:sp>
-        <p:nvSpPr>
-          <p:cNvPr id="5" name="Text Placeholder 4">
+              <a:rPr lang="en-PK" dirty="0"/>
+              <a:t>Create Workspace</a:t>
+            </a:r>
+          </a:p>
+        </p:txBody>
+      </p:sp>
+      <p:pic>
+        <p:nvPicPr>
+          <p:cNvPr id="2" name="Picture 1">
             <a:extLst>
               <a:ext uri="{FF2B5EF4-FFF2-40B4-BE49-F238E27FC236}">
-                <a16:creationId xmlns:a16="http://schemas.microsoft.com/office/drawing/2014/main" id="{4E9A3CBC-D866-46E5-AA37-8D47564F10CA}"/>
+                <a16:creationId xmlns:a16="http://schemas.microsoft.com/office/drawing/2014/main" id="{2CF8CA95-BE49-8893-098C-EF29158BEA63}"/>
               </a:ext>
             </a:extLst>
           </p:cNvPr>
-          <p:cNvSpPr>
-            <a:spLocks noGrp="1"/>
-          </p:cNvSpPr>
-          <p:nvPr>
-            <p:ph type="body" idx="1"/>
-          </p:nvPr>
-        </p:nvSpPr>
-        <p:spPr/>
-        <p:txBody>
-          <a:bodyPr/>
-          <a:lstStyle/>
-          <a:p>
+          <p:cNvPicPr>
+            <a:picLocks noChangeAspect="1"/>
+          </p:cNvPicPr>
+          <p:nvPr/>
+        </p:nvPicPr>
+        <p:blipFill rotWithShape="1">
+          <a:blip r:embed="rId2">
+            <a:extLst>
+              <a:ext uri="{28A0092B-C50C-407E-A947-70E740481C1C}">
+                <a14:useLocalDpi xmlns:a14="http://schemas.microsoft.com/office/drawing/2010/main" val="0"/>
+              </a:ext>
+            </a:extLst>
+          </a:blip>
+          <a:srcRect r="14184"/>
+          <a:stretch/>
+        </p:blipFill>
+        <p:spPr>
+          <a:xfrm>
+            <a:off x="838200" y="4335611"/>
+            <a:ext cx="11224800" cy="1080000"/>
+          </a:xfrm>
+          <a:prstGeom prst="rect">
+            <a:avLst/>
+          </a:prstGeom>
+        </p:spPr>
+      </p:pic>
+      <p:sp>
+        <p:nvSpPr>
+          <p:cNvPr id="3" name="TextBox 2">
+            <a:extLst>
+              <a:ext uri="{FF2B5EF4-FFF2-40B4-BE49-F238E27FC236}">
+                <a16:creationId xmlns:a16="http://schemas.microsoft.com/office/drawing/2014/main" id="{B285AFE6-E95C-3342-AD3F-7F24CA75F46F}"/>
+              </a:ext>
+            </a:extLst>
+          </p:cNvPr>
+          <p:cNvSpPr txBox="1"/>
+          <p:nvPr/>
+        </p:nvSpPr>
+        <p:spPr>
+          <a:xfrm>
+            <a:off x="838200" y="3966279"/>
+            <a:ext cx="2456329" cy="369332"/>
+          </a:xfrm>
+          <a:prstGeom prst="rect">
+            <a:avLst/>
+          </a:prstGeom>
+          <a:solidFill>
+            <a:schemeClr val="accent4"/>
+          </a:solidFill>
+        </p:spPr>
+        <p:txBody>
+          <a:bodyPr wrap="square">
+            <a:spAutoFit/>
+          </a:bodyPr>
+          <a:lstStyle/>
+          <a:p>
+            <a:r>
+              <a:rPr lang="en-GB" dirty="0"/>
+              <a:t>List the downloaded file</a:t>
+            </a:r>
             <a:endParaRPr lang="en-US" dirty="0"/>
+          </a:p>
+        </p:txBody>
+      </p:sp>
+      <p:sp>
+        <p:nvSpPr>
+          <p:cNvPr id="8" name="TextBox 7">
+            <a:extLst>
+              <a:ext uri="{FF2B5EF4-FFF2-40B4-BE49-F238E27FC236}">
+                <a16:creationId xmlns:a16="http://schemas.microsoft.com/office/drawing/2014/main" id="{EB5EB148-21B4-6579-A5BE-D7B4C1AFC5CF}"/>
+              </a:ext>
+            </a:extLst>
+          </p:cNvPr>
+          <p:cNvSpPr txBox="1"/>
+          <p:nvPr/>
+        </p:nvSpPr>
+        <p:spPr>
+          <a:xfrm>
+            <a:off x="838200" y="1690688"/>
+            <a:ext cx="3370729" cy="369332"/>
+          </a:xfrm>
+          <a:prstGeom prst="rect">
+            <a:avLst/>
+          </a:prstGeom>
+          <a:solidFill>
+            <a:schemeClr val="accent4"/>
+          </a:solidFill>
+        </p:spPr>
+        <p:txBody>
+          <a:bodyPr wrap="square">
+            <a:spAutoFit/>
+          </a:bodyPr>
+          <a:lstStyle/>
+          <a:p>
+            <a:r>
+              <a:rPr lang="en-GB" dirty="0"/>
+              <a:t>Create workspace / new directory</a:t>
+            </a:r>
+            <a:endParaRPr lang="en-US" dirty="0"/>
+          </a:p>
+        </p:txBody>
+      </p:sp>
+      <p:pic>
+        <p:nvPicPr>
+          <p:cNvPr id="10" name="Picture 9" descr="A red lines on a black background&#10;&#10;Description automatically generated">
+            <a:extLst>
+              <a:ext uri="{FF2B5EF4-FFF2-40B4-BE49-F238E27FC236}">
+                <a16:creationId xmlns:a16="http://schemas.microsoft.com/office/drawing/2014/main" id="{DE7D3F4C-3B48-6A4C-B75D-100EB8505CAE}"/>
+              </a:ext>
+            </a:extLst>
+          </p:cNvPr>
+          <p:cNvPicPr>
+            <a:picLocks noChangeAspect="1"/>
+          </p:cNvPicPr>
+          <p:nvPr/>
+        </p:nvPicPr>
+        <p:blipFill>
+          <a:blip r:embed="rId3">
+            <a:extLst>
+              <a:ext uri="{28A0092B-C50C-407E-A947-70E740481C1C}">
+                <a14:useLocalDpi xmlns:a14="http://schemas.microsoft.com/office/drawing/2010/main" val="0"/>
+              </a:ext>
+            </a:extLst>
+          </a:blip>
+          <a:stretch>
+            <a:fillRect/>
+          </a:stretch>
+        </p:blipFill>
+        <p:spPr>
+          <a:xfrm>
+            <a:off x="847164" y="2060020"/>
+            <a:ext cx="6934200" cy="1689100"/>
+          </a:xfrm>
+          <a:prstGeom prst="rect">
+            <a:avLst/>
+          </a:prstGeom>
+        </p:spPr>
+      </p:pic>
+      <p:sp>
+        <p:nvSpPr>
+          <p:cNvPr id="11" name="TextBox 10">
+            <a:extLst>
+              <a:ext uri="{FF2B5EF4-FFF2-40B4-BE49-F238E27FC236}">
+                <a16:creationId xmlns:a16="http://schemas.microsoft.com/office/drawing/2014/main" id="{2FC558F4-F209-33F5-B966-B70F27BD1F69}"/>
+              </a:ext>
+            </a:extLst>
+          </p:cNvPr>
+          <p:cNvSpPr txBox="1"/>
+          <p:nvPr/>
+        </p:nvSpPr>
+        <p:spPr>
+          <a:xfrm>
+            <a:off x="838200" y="5601379"/>
+            <a:ext cx="10515600" cy="646331"/>
+          </a:xfrm>
+          <a:prstGeom prst="rect">
+            <a:avLst/>
+          </a:prstGeom>
+          <a:solidFill>
+            <a:schemeClr val="accent4">
+              <a:lumMod val="20000"/>
+              <a:lumOff val="80000"/>
+            </a:schemeClr>
+          </a:solidFill>
+        </p:spPr>
+        <p:txBody>
+          <a:bodyPr wrap="square" rtlCol="0">
+            <a:spAutoFit/>
+          </a:bodyPr>
+          <a:lstStyle/>
+          <a:p>
+            <a:pPr marL="185738" indent="-185738">
+              <a:buFont typeface="Arial" panose="020B0604020202020204" pitchFamily="34" charset="0"/>
+              <a:buChar char="•"/>
+            </a:pPr>
+            <a:r>
+              <a:rPr lang="en-GB" dirty="0"/>
+              <a:t>The location of the image file can be different in your case</a:t>
+            </a:r>
+          </a:p>
+          <a:p>
+            <a:pPr marL="185738" indent="-185738">
+              <a:buFont typeface="Arial" panose="020B0604020202020204" pitchFamily="34" charset="0"/>
+              <a:buChar char="•"/>
+            </a:pPr>
+            <a:r>
+              <a:rPr lang="en-GB" dirty="0"/>
+              <a:t>In this case, the image file is on the host computer &amp; being accessed on the VM through a shared folder</a:t>
+            </a:r>
           </a:p>
         </p:txBody>
       </p:sp>
     </p:spTree>
     <p:extLst>
       <p:ext uri="{BB962C8B-B14F-4D97-AF65-F5344CB8AC3E}">
-        <p14:creationId xmlns:p14="http://schemas.microsoft.com/office/powerpoint/2010/main" val="1565627283"/>
+        <p14:creationId xmlns:p14="http://schemas.microsoft.com/office/powerpoint/2010/main" val="802487842"/>
       </p:ext>
     </p:extLst>
   </p:cSld>

</xml_diff>

<commit_message>
fix echo device download links
</commit_message>
<xml_diff>
--- a/Echo_Device/ppts/3_Image_Acquisition_and_Mounting.pptx
+++ b/Echo_Device/ppts/3_Image_Acquisition_and_Mounting.pptx
@@ -135,6 +135,35 @@
 </p:presentation>
 </file>
 
+<file path=ppt/changesInfos/changesInfo1.xml><?xml version="1.0" encoding="utf-8"?>
+<pc:chgInfo xmlns:a="http://schemas.openxmlformats.org/drawingml/2006/main" xmlns:r="http://schemas.openxmlformats.org/officeDocument/2006/relationships" xmlns:ac="http://schemas.microsoft.com/office/drawing/2013/main/command" xmlns:pc="http://schemas.microsoft.com/office/powerpoint/2013/main/command">
+  <pc:docChgLst>
+    <pc:chgData name="Weifeng Xu" userId="e7aed605-a3dd-4d5a-a692-a87037af107b" providerId="ADAL" clId="{91C301E0-3F89-4277-820A-3E3344826961}"/>
+    <pc:docChg chg="custSel modSld">
+      <pc:chgData name="Weifeng Xu" userId="e7aed605-a3dd-4d5a-a692-a87037af107b" providerId="ADAL" clId="{91C301E0-3F89-4277-820A-3E3344826961}" dt="2024-05-23T19:00:24.924" v="5" actId="27636"/>
+      <pc:docMkLst>
+        <pc:docMk/>
+      </pc:docMkLst>
+      <pc:sldChg chg="modSp mod">
+        <pc:chgData name="Weifeng Xu" userId="e7aed605-a3dd-4d5a-a692-a87037af107b" providerId="ADAL" clId="{91C301E0-3F89-4277-820A-3E3344826961}" dt="2024-05-23T19:00:24.924" v="5" actId="27636"/>
+        <pc:sldMkLst>
+          <pc:docMk/>
+          <pc:sldMk cId="196530033" sldId="894"/>
+        </pc:sldMkLst>
+        <pc:spChg chg="mod">
+          <ac:chgData name="Weifeng Xu" userId="e7aed605-a3dd-4d5a-a692-a87037af107b" providerId="ADAL" clId="{91C301E0-3F89-4277-820A-3E3344826961}" dt="2024-05-23T19:00:24.924" v="5" actId="27636"/>
+          <ac:spMkLst>
+            <pc:docMk/>
+            <pc:sldMk cId="196530033" sldId="894"/>
+            <ac:spMk id="5" creationId="{34C14577-D30B-6F08-C41A-FF1930E20EFC}"/>
+          </ac:spMkLst>
+        </pc:spChg>
+      </pc:sldChg>
+    </pc:docChg>
+  </pc:docChgLst>
+</pc:chgInfo>
+</file>
+
 <file path=ppt/notesMasters/notesMaster1.xml><?xml version="1.0" encoding="utf-8"?>
 <p:notesMaster xmlns:a="http://schemas.openxmlformats.org/drawingml/2006/main" xmlns:r="http://schemas.openxmlformats.org/officeDocument/2006/relationships" xmlns:p="http://schemas.openxmlformats.org/presentationml/2006/main">
   <p:cSld>
@@ -217,7 +246,7 @@
           <a:p>
             <a:fld id="{EE41F6E3-57F9-402E-BDBA-5B2DE11C8530}" type="datetimeFigureOut">
               <a:rPr lang="en-US" smtClean="0"/>
-              <a:t>1/4/24</a:t>
+              <a:t>5/23/2024</a:t>
             </a:fld>
             <a:endParaRPr lang="en-US"/>
           </a:p>
@@ -799,7 +828,7 @@
           <a:p>
             <a:fld id="{41259AFC-504E-1C4E-B6EF-55A9A474ECB1}" type="datetime1">
               <a:rPr lang="en-US" smtClean="0"/>
-              <a:t>1/4/24</a:t>
+              <a:t>5/23/2024</a:t>
             </a:fld>
             <a:endParaRPr lang="en-US"/>
           </a:p>
@@ -972,7 +1001,7 @@
           <a:p>
             <a:fld id="{D0F9DBC4-577B-D840-8CA5-93F4B76C0210}" type="datetime1">
               <a:rPr lang="en-US" smtClean="0"/>
-              <a:t>1/4/24</a:t>
+              <a:t>5/23/2024</a:t>
             </a:fld>
             <a:endParaRPr lang="en-US"/>
           </a:p>
@@ -1150,7 +1179,7 @@
           <a:p>
             <a:fld id="{227C5582-5046-3E42-BCC7-72ADA1A24621}" type="datetime1">
               <a:rPr lang="en-US" smtClean="0"/>
-              <a:t>1/4/24</a:t>
+              <a:t>5/23/2024</a:t>
             </a:fld>
             <a:endParaRPr lang="en-US"/>
           </a:p>
@@ -1318,7 +1347,7 @@
           <a:p>
             <a:fld id="{1FD79B34-1669-4741-B0AB-B90F9E524E4C}" type="datetime1">
               <a:rPr lang="en-US" smtClean="0"/>
-              <a:t>1/4/24</a:t>
+              <a:t>5/23/2024</a:t>
             </a:fld>
             <a:endParaRPr lang="en-US"/>
           </a:p>
@@ -1563,7 +1592,7 @@
           <a:p>
             <a:fld id="{BAC2E8E5-437A-4043-8EB7-FC47F00F1EF6}" type="datetime1">
               <a:rPr lang="en-US" smtClean="0"/>
-              <a:t>1/4/24</a:t>
+              <a:t>5/23/2024</a:t>
             </a:fld>
             <a:endParaRPr lang="en-US"/>
           </a:p>
@@ -1792,7 +1821,7 @@
           <a:p>
             <a:fld id="{38F7D966-F9DC-0540-930B-E1258AAFF056}" type="datetime1">
               <a:rPr lang="en-US" smtClean="0"/>
-              <a:t>1/4/24</a:t>
+              <a:t>5/23/2024</a:t>
             </a:fld>
             <a:endParaRPr lang="en-US"/>
           </a:p>
@@ -2156,7 +2185,7 @@
           <a:p>
             <a:fld id="{9982B607-4871-FB40-9574-39B6CEB2812A}" type="datetime1">
               <a:rPr lang="en-US" smtClean="0"/>
-              <a:t>1/4/24</a:t>
+              <a:t>5/23/2024</a:t>
             </a:fld>
             <a:endParaRPr lang="en-US"/>
           </a:p>
@@ -2273,7 +2302,7 @@
           <a:p>
             <a:fld id="{AABA27B2-8C00-F84D-ABBA-9E279CB9D7DB}" type="datetime1">
               <a:rPr lang="en-US" smtClean="0"/>
-              <a:t>1/4/24</a:t>
+              <a:t>5/23/2024</a:t>
             </a:fld>
             <a:endParaRPr lang="en-US"/>
           </a:p>
@@ -2368,7 +2397,7 @@
           <a:p>
             <a:fld id="{B422F593-57A6-2B42-9344-2115EAEE62EE}" type="datetime1">
               <a:rPr lang="en-US" smtClean="0"/>
-              <a:t>1/4/24</a:t>
+              <a:t>5/23/2024</a:t>
             </a:fld>
             <a:endParaRPr lang="en-US"/>
           </a:p>
@@ -2643,7 +2672,7 @@
           <a:p>
             <a:fld id="{190F6A29-CBA8-FC40-8655-A3A03586A58F}" type="datetime1">
               <a:rPr lang="en-US" smtClean="0"/>
-              <a:t>1/4/24</a:t>
+              <a:t>5/23/2024</a:t>
             </a:fld>
             <a:endParaRPr lang="en-US"/>
           </a:p>
@@ -2895,7 +2924,7 @@
           <a:p>
             <a:fld id="{C61BE55D-101C-1E42-8ADB-8C738A947EF3}" type="datetime1">
               <a:rPr lang="en-US" smtClean="0"/>
-              <a:t>1/4/24</a:t>
+              <a:t>5/23/2024</a:t>
             </a:fld>
             <a:endParaRPr lang="en-US"/>
           </a:p>
@@ -3106,7 +3135,7 @@
           <a:p>
             <a:fld id="{953266A5-900F-614B-ABA3-875DBE56748E}" type="datetime1">
               <a:rPr lang="en-US" smtClean="0"/>
-              <a:t>1/4/24</a:t>
+              <a:t>5/23/2024</a:t>
             </a:fld>
             <a:endParaRPr lang="en-US"/>
           </a:p>
@@ -7216,8 +7245,8 @@
         </p:nvSpPr>
         <p:spPr>
           <a:xfrm>
-            <a:off x="838200" y="1825625"/>
-            <a:ext cx="10515600" cy="4077634"/>
+            <a:off x="838200" y="1825624"/>
+            <a:ext cx="10515600" cy="3035133"/>
           </a:xfrm>
         </p:spPr>
         <p:txBody>
@@ -7252,21 +7281,20 @@
             </a:r>
           </a:p>
           <a:p>
-            <a:endParaRPr lang="en-GB" sz="2800" dirty="0">
-              <a:hlinkClick r:id="rId2"/>
-            </a:endParaRPr>
+            <a:endParaRPr lang="en-GB" dirty="0"/>
           </a:p>
           <a:p>
             <a:pPr marL="0" indent="0" algn="ctr">
               <a:buNone/>
             </a:pPr>
             <a:r>
-              <a:rPr lang="en-GB" sz="2800" dirty="0">
-                <a:hlinkClick r:id="rId2"/>
-              </a:rPr>
-              <a:t>https://miya.teracloud.jp/share/11d194c7357b5632</a:t>
-            </a:r>
-            <a:endParaRPr lang="en-GB" sz="2800" dirty="0"/>
+              <a:rPr lang="en-GB" dirty="0"/>
+              <a:t>https://miya.teracloud.jp/share/</a:t>
+            </a:r>
+            <a:r>
+              <a:rPr lang="en-GB" sz="2800" dirty="0"/>
+              <a:t>11d1e631cf6f8456</a:t>
+            </a:r>
           </a:p>
           <a:p>
             <a:endParaRPr lang="en-GB" sz="2800" dirty="0"/>

</xml_diff>